<commit_message>
Update issue lifecycle and workflow diagram
</commit_message>
<xml_diff>
--- a/docs/images/IssueLifecycle.pptx
+++ b/docs/images/IssueLifecycle.pptx
@@ -10,7 +10,7 @@
   <p:sldIdLst>
     <p:sldId id="256" r:id="rId2"/>
   </p:sldIdLst>
-  <p:sldSz cx="7740650" cy="2592388"/>
+  <p:sldSz cx="7740650" cy="2879725"/>
   <p:notesSz cx="6858000" cy="9144000"/>
   <p:defaultTextStyle>
     <a:defPPr>
@@ -110,12 +110,12 @@
   <p:extLst>
     <p:ext uri="{EFAFB233-063F-42B5-8137-9DF3F51BA10A}">
       <p15:sldGuideLst xmlns:p15="http://schemas.microsoft.com/office/powerpoint/2012/main">
-        <p15:guide id="1" orient="horz" pos="817">
+        <p15:guide id="1" orient="horz" pos="908" userDrawn="1">
           <p15:clr>
             <a:srgbClr val="A4A3A4"/>
           </p15:clr>
         </p15:guide>
-        <p15:guide id="2" pos="2439">
+        <p15:guide id="2" pos="2439" userDrawn="1">
           <p15:clr>
             <a:srgbClr val="A4A3A4"/>
           </p15:clr>
@@ -208,7 +208,7 @@
           <a:p>
             <a:fld id="{EB56B9F1-9881-483D-AC17-B3C6E9A32E68}" type="datetimeFigureOut">
               <a:rPr lang="en-SG" smtClean="0"/>
-              <a:t>10/2/2016</a:t>
+              <a:t>18/3/2018</a:t>
             </a:fld>
             <a:endParaRPr lang="en-SG"/>
           </a:p>
@@ -226,8 +226,8 @@
         </p:nvSpPr>
         <p:spPr>
           <a:xfrm>
-            <a:off x="-1689100" y="685800"/>
-            <a:ext cx="10236200" cy="3429000"/>
+            <a:off x="-1179513" y="685800"/>
+            <a:ext cx="9217026" cy="3429000"/>
           </a:xfrm>
           <a:prstGeom prst="rect">
             <a:avLst/>
@@ -505,8 +505,8 @@
         </p:nvSpPr>
         <p:spPr>
           <a:xfrm>
-            <a:off x="-1689100" y="685800"/>
-            <a:ext cx="10236200" cy="3429000"/>
+            <a:off x="-1179513" y="685800"/>
+            <a:ext cx="9217026" cy="3429000"/>
           </a:xfrm>
         </p:spPr>
       </p:sp>
@@ -594,8 +594,8 @@
         </p:nvSpPr>
         <p:spPr>
           <a:xfrm>
-            <a:off x="580550" y="805322"/>
-            <a:ext cx="6579553" cy="555684"/>
+            <a:off x="580550" y="894583"/>
+            <a:ext cx="6579553" cy="617275"/>
           </a:xfrm>
         </p:spPr>
         <p:txBody>
@@ -622,8 +622,8 @@
         </p:nvSpPr>
         <p:spPr>
           <a:xfrm>
-            <a:off x="1161098" y="1469022"/>
-            <a:ext cx="5418455" cy="662499"/>
+            <a:off x="1161099" y="1631847"/>
+            <a:ext cx="5418455" cy="735930"/>
           </a:xfrm>
         </p:spPr>
         <p:txBody>
@@ -747,7 +747,7 @@
             <a:fld id="{1D8BD707-D9CF-40AE-B4C6-C98DA3205C09}" type="datetimeFigureOut">
               <a:rPr lang="en-US" smtClean="0"/>
               <a:pPr/>
-              <a:t>2/10/2016</a:t>
+              <a:t>3/18/2018</a:t>
             </a:fld>
             <a:endParaRPr lang="en-US"/>
           </a:p>
@@ -914,7 +914,7 @@
             <a:fld id="{1D8BD707-D9CF-40AE-B4C6-C98DA3205C09}" type="datetimeFigureOut">
               <a:rPr lang="en-US" smtClean="0"/>
               <a:pPr/>
-              <a:t>2/10/2016</a:t>
+              <a:t>3/18/2018</a:t>
             </a:fld>
             <a:endParaRPr lang="en-US"/>
           </a:p>
@@ -1000,8 +1000,8 @@
         </p:nvSpPr>
         <p:spPr>
           <a:xfrm>
-            <a:off x="5611975" y="103817"/>
-            <a:ext cx="1741647" cy="2211930"/>
+            <a:off x="5611976" y="115324"/>
+            <a:ext cx="1741647" cy="2457098"/>
           </a:xfrm>
         </p:spPr>
         <p:txBody>
@@ -1028,8 +1028,8 @@
         </p:nvSpPr>
         <p:spPr>
           <a:xfrm>
-            <a:off x="387034" y="103817"/>
-            <a:ext cx="5095928" cy="2211930"/>
+            <a:off x="387034" y="115324"/>
+            <a:ext cx="5095928" cy="2457098"/>
           </a:xfrm>
         </p:spPr>
         <p:txBody>
@@ -1091,7 +1091,7 @@
             <a:fld id="{1D8BD707-D9CF-40AE-B4C6-C98DA3205C09}" type="datetimeFigureOut">
               <a:rPr lang="en-US" smtClean="0"/>
               <a:pPr/>
-              <a:t>2/10/2016</a:t>
+              <a:t>3/18/2018</a:t>
             </a:fld>
             <a:endParaRPr lang="en-US"/>
           </a:p>
@@ -1258,7 +1258,7 @@
             <a:fld id="{1D8BD707-D9CF-40AE-B4C6-C98DA3205C09}" type="datetimeFigureOut">
               <a:rPr lang="en-US" smtClean="0"/>
               <a:pPr/>
-              <a:t>2/10/2016</a:t>
+              <a:t>3/18/2018</a:t>
             </a:fld>
             <a:endParaRPr lang="en-US"/>
           </a:p>
@@ -1344,8 +1344,8 @@
         </p:nvSpPr>
         <p:spPr>
           <a:xfrm>
-            <a:off x="611459" y="1665852"/>
-            <a:ext cx="6579553" cy="514877"/>
+            <a:off x="611460" y="1850494"/>
+            <a:ext cx="6579553" cy="571945"/>
           </a:xfrm>
         </p:spPr>
         <p:txBody>
@@ -1376,8 +1376,8 @@
         </p:nvSpPr>
         <p:spPr>
           <a:xfrm>
-            <a:off x="611459" y="1098766"/>
-            <a:ext cx="6579553" cy="567085"/>
+            <a:off x="611460" y="1220552"/>
+            <a:ext cx="6579553" cy="629940"/>
           </a:xfrm>
         </p:spPr>
         <p:txBody>
@@ -1501,7 +1501,7 @@
             <a:fld id="{1D8BD707-D9CF-40AE-B4C6-C98DA3205C09}" type="datetimeFigureOut">
               <a:rPr lang="en-US" smtClean="0"/>
               <a:pPr/>
-              <a:t>2/10/2016</a:t>
+              <a:t>3/18/2018</a:t>
             </a:fld>
             <a:endParaRPr lang="en-US"/>
           </a:p>
@@ -1610,8 +1610,8 @@
         </p:nvSpPr>
         <p:spPr>
           <a:xfrm>
-            <a:off x="387032" y="604894"/>
-            <a:ext cx="3418787" cy="1710857"/>
+            <a:off x="387033" y="671940"/>
+            <a:ext cx="3418787" cy="1900486"/>
           </a:xfrm>
         </p:spPr>
         <p:txBody>
@@ -1695,8 +1695,8 @@
         </p:nvSpPr>
         <p:spPr>
           <a:xfrm>
-            <a:off x="3934831" y="604894"/>
-            <a:ext cx="3418787" cy="1710857"/>
+            <a:off x="3934832" y="671940"/>
+            <a:ext cx="3418787" cy="1900486"/>
           </a:xfrm>
         </p:spPr>
         <p:txBody>
@@ -1786,7 +1786,7 @@
             <a:fld id="{1D8BD707-D9CF-40AE-B4C6-C98DA3205C09}" type="datetimeFigureOut">
               <a:rPr lang="en-US" smtClean="0"/>
               <a:pPr/>
-              <a:t>2/10/2016</a:t>
+              <a:t>3/18/2018</a:t>
             </a:fld>
             <a:endParaRPr lang="en-US"/>
           </a:p>
@@ -1899,8 +1899,8 @@
         </p:nvSpPr>
         <p:spPr>
           <a:xfrm>
-            <a:off x="387033" y="580289"/>
-            <a:ext cx="3420131" cy="241835"/>
+            <a:off x="387034" y="644608"/>
+            <a:ext cx="3420131" cy="268640"/>
           </a:xfrm>
         </p:spPr>
         <p:txBody>
@@ -1964,8 +1964,8 @@
         </p:nvSpPr>
         <p:spPr>
           <a:xfrm>
-            <a:off x="387033" y="822125"/>
-            <a:ext cx="3420131" cy="1493624"/>
+            <a:off x="387034" y="913248"/>
+            <a:ext cx="3420131" cy="1659175"/>
           </a:xfrm>
         </p:spPr>
         <p:txBody>
@@ -2049,8 +2049,8 @@
         </p:nvSpPr>
         <p:spPr>
           <a:xfrm>
-            <a:off x="3932146" y="580289"/>
-            <a:ext cx="3421475" cy="241835"/>
+            <a:off x="3932147" y="644608"/>
+            <a:ext cx="3421475" cy="268640"/>
           </a:xfrm>
         </p:spPr>
         <p:txBody>
@@ -2114,8 +2114,8 @@
         </p:nvSpPr>
         <p:spPr>
           <a:xfrm>
-            <a:off x="3932146" y="822125"/>
-            <a:ext cx="3421475" cy="1493624"/>
+            <a:off x="3932147" y="913248"/>
+            <a:ext cx="3421475" cy="1659175"/>
           </a:xfrm>
         </p:spPr>
         <p:txBody>
@@ -2205,7 +2205,7 @@
             <a:fld id="{1D8BD707-D9CF-40AE-B4C6-C98DA3205C09}" type="datetimeFigureOut">
               <a:rPr lang="en-US" smtClean="0"/>
               <a:pPr/>
-              <a:t>2/10/2016</a:t>
+              <a:t>3/18/2018</a:t>
             </a:fld>
             <a:endParaRPr lang="en-US"/>
           </a:p>
@@ -2320,7 +2320,7 @@
             <a:fld id="{1D8BD707-D9CF-40AE-B4C6-C98DA3205C09}" type="datetimeFigureOut">
               <a:rPr lang="en-US" smtClean="0"/>
               <a:pPr/>
-              <a:t>2/10/2016</a:t>
+              <a:t>3/18/2018</a:t>
             </a:fld>
             <a:endParaRPr lang="en-US"/>
           </a:p>
@@ -2412,7 +2412,7 @@
             <a:fld id="{1D8BD707-D9CF-40AE-B4C6-C98DA3205C09}" type="datetimeFigureOut">
               <a:rPr lang="en-US" smtClean="0"/>
               <a:pPr/>
-              <a:t>2/10/2016</a:t>
+              <a:t>3/18/2018</a:t>
             </a:fld>
             <a:endParaRPr lang="en-US"/>
           </a:p>
@@ -2498,8 +2498,8 @@
         </p:nvSpPr>
         <p:spPr>
           <a:xfrm>
-            <a:off x="387035" y="103218"/>
-            <a:ext cx="2546621" cy="439265"/>
+            <a:off x="387036" y="114659"/>
+            <a:ext cx="2546621" cy="487953"/>
           </a:xfrm>
         </p:spPr>
         <p:txBody>
@@ -2530,8 +2530,8 @@
         </p:nvSpPr>
         <p:spPr>
           <a:xfrm>
-            <a:off x="3026379" y="103218"/>
-            <a:ext cx="4327238" cy="2212531"/>
+            <a:off x="3026379" y="114659"/>
+            <a:ext cx="4327238" cy="2457765"/>
           </a:xfrm>
         </p:spPr>
         <p:txBody>
@@ -2615,8 +2615,8 @@
         </p:nvSpPr>
         <p:spPr>
           <a:xfrm>
-            <a:off x="387035" y="542483"/>
-            <a:ext cx="2546621" cy="1773265"/>
+            <a:off x="387036" y="602612"/>
+            <a:ext cx="2546621" cy="1969811"/>
           </a:xfrm>
         </p:spPr>
         <p:txBody>
@@ -2686,7 +2686,7 @@
             <a:fld id="{1D8BD707-D9CF-40AE-B4C6-C98DA3205C09}" type="datetimeFigureOut">
               <a:rPr lang="en-US" smtClean="0"/>
               <a:pPr/>
-              <a:t>2/10/2016</a:t>
+              <a:t>3/18/2018</a:t>
             </a:fld>
             <a:endParaRPr lang="en-US"/>
           </a:p>
@@ -2772,8 +2772,8 @@
         </p:nvSpPr>
         <p:spPr>
           <a:xfrm>
-            <a:off x="1517222" y="1814675"/>
-            <a:ext cx="4644390" cy="214232"/>
+            <a:off x="1517222" y="2015811"/>
+            <a:ext cx="4644390" cy="237977"/>
           </a:xfrm>
         </p:spPr>
         <p:txBody>
@@ -2804,8 +2804,8 @@
         </p:nvSpPr>
         <p:spPr>
           <a:xfrm>
-            <a:off x="1517222" y="231637"/>
-            <a:ext cx="4644390" cy="1555433"/>
+            <a:off x="1517222" y="257312"/>
+            <a:ext cx="4644390" cy="1727835"/>
           </a:xfrm>
         </p:spPr>
         <p:txBody>
@@ -2865,8 +2865,8 @@
         </p:nvSpPr>
         <p:spPr>
           <a:xfrm>
-            <a:off x="1517222" y="2028905"/>
-            <a:ext cx="4644390" cy="304245"/>
+            <a:off x="1517222" y="2253787"/>
+            <a:ext cx="4644390" cy="337967"/>
           </a:xfrm>
         </p:spPr>
         <p:txBody>
@@ -2936,7 +2936,7 @@
             <a:fld id="{1D8BD707-D9CF-40AE-B4C6-C98DA3205C09}" type="datetimeFigureOut">
               <a:rPr lang="en-US" smtClean="0"/>
               <a:pPr/>
-              <a:t>2/10/2016</a:t>
+              <a:t>3/18/2018</a:t>
             </a:fld>
             <a:endParaRPr lang="en-US"/>
           </a:p>
@@ -3027,8 +3027,8 @@
         </p:nvSpPr>
         <p:spPr>
           <a:xfrm>
-            <a:off x="387036" y="103820"/>
-            <a:ext cx="6966585" cy="432065"/>
+            <a:off x="387037" y="115328"/>
+            <a:ext cx="6966585" cy="479955"/>
           </a:xfrm>
           <a:prstGeom prst="rect">
             <a:avLst/>
@@ -3060,8 +3060,8 @@
         </p:nvSpPr>
         <p:spPr>
           <a:xfrm>
-            <a:off x="387036" y="604894"/>
-            <a:ext cx="6966585" cy="1710857"/>
+            <a:off x="387037" y="671940"/>
+            <a:ext cx="6966585" cy="1900486"/>
           </a:xfrm>
           <a:prstGeom prst="rect">
             <a:avLst/>
@@ -3122,8 +3122,8 @@
         </p:nvSpPr>
         <p:spPr>
           <a:xfrm>
-            <a:off x="387035" y="2402762"/>
-            <a:ext cx="1806152" cy="138021"/>
+            <a:off x="387035" y="2669082"/>
+            <a:ext cx="1806152" cy="153319"/>
           </a:xfrm>
           <a:prstGeom prst="rect">
             <a:avLst/>
@@ -3146,7 +3146,7 @@
             <a:fld id="{1D8BD707-D9CF-40AE-B4C6-C98DA3205C09}" type="datetimeFigureOut">
               <a:rPr lang="en-US" smtClean="0"/>
               <a:pPr/>
-              <a:t>2/10/2016</a:t>
+              <a:t>3/18/2018</a:t>
             </a:fld>
             <a:endParaRPr lang="en-US"/>
           </a:p>
@@ -3164,8 +3164,8 @@
         </p:nvSpPr>
         <p:spPr>
           <a:xfrm>
-            <a:off x="2644724" y="2402762"/>
-            <a:ext cx="2451206" cy="138021"/>
+            <a:off x="2644724" y="2669082"/>
+            <a:ext cx="2451206" cy="153319"/>
           </a:xfrm>
           <a:prstGeom prst="rect">
             <a:avLst/>
@@ -3201,8 +3201,8 @@
         </p:nvSpPr>
         <p:spPr>
           <a:xfrm>
-            <a:off x="5547469" y="2402762"/>
-            <a:ext cx="1806152" cy="138021"/>
+            <a:off x="5547469" y="2669082"/>
+            <a:ext cx="1806152" cy="153319"/>
           </a:xfrm>
           <a:prstGeom prst="rect">
             <a:avLst/>
@@ -3525,8 +3525,8 @@
         </p:nvSpPr>
         <p:spPr>
           <a:xfrm>
-            <a:off x="3979440" y="76993"/>
-            <a:ext cx="3742061" cy="1594097"/>
+            <a:off x="3979441" y="112160"/>
+            <a:ext cx="3742061" cy="1589640"/>
           </a:xfrm>
           <a:prstGeom prst="roundRect">
             <a:avLst>
@@ -3576,7 +3576,7 @@
         </p:nvSpPr>
         <p:spPr>
           <a:xfrm>
-            <a:off x="107393" y="76994"/>
+            <a:off x="107393" y="112159"/>
             <a:ext cx="3657600" cy="1594097"/>
           </a:xfrm>
           <a:prstGeom prst="roundRect">
@@ -3627,8 +3627,8 @@
         </p:nvSpPr>
         <p:spPr>
           <a:xfrm>
-            <a:off x="123207" y="2272425"/>
-            <a:ext cx="5347318" cy="293769"/>
+            <a:off x="1889125" y="2430462"/>
+            <a:ext cx="3852000" cy="347950"/>
           </a:xfrm>
           <a:prstGeom prst="roundRect">
             <a:avLst/>
@@ -3675,8 +3675,8 @@
         </p:nvSpPr>
         <p:spPr>
           <a:xfrm>
-            <a:off x="917476" y="839187"/>
-            <a:ext cx="1700606" cy="239760"/>
+            <a:off x="1866480" y="830262"/>
+            <a:ext cx="1535810" cy="239760"/>
           </a:xfrm>
           <a:prstGeom prst="roundRect">
             <a:avLst>
@@ -3710,7 +3710,7 @@
           <a:p>
             <a:pPr algn="ctr"/>
             <a:r>
-              <a:rPr lang="en-US" sz="1400" b="1" dirty="0" smtClean="0">
+              <a:rPr lang="en-US" sz="1400" b="1" dirty="0">
                 <a:solidFill>
                   <a:schemeClr val="tx1">
                     <a:lumMod val="50000"/>
@@ -3720,18 +3720,8 @@
                 <a:latin typeface="Consolas" pitchFamily="49" charset="0"/>
                 <a:cs typeface="Consolas" pitchFamily="49" charset="0"/>
               </a:rPr>
-              <a:t>Prioritized</a:t>
-            </a:r>
-            <a:endParaRPr lang="en-US" sz="1400" b="1" dirty="0" smtClean="0">
-              <a:solidFill>
-                <a:schemeClr val="tx1">
-                  <a:lumMod val="50000"/>
-                  <a:lumOff val="50000"/>
-                </a:schemeClr>
-              </a:solidFill>
-              <a:latin typeface="Consolas" pitchFamily="49" charset="0"/>
-              <a:cs typeface="Consolas" pitchFamily="49" charset="0"/>
-            </a:endParaRPr>
+              <a:t>Accepted</a:t>
+            </a:r>
           </a:p>
         </p:txBody>
       </p:sp>
@@ -3743,8 +3733,8 @@
         </p:nvSpPr>
         <p:spPr>
           <a:xfrm>
-            <a:off x="6025272" y="312864"/>
-            <a:ext cx="1426453" cy="244729"/>
+            <a:off x="6025272" y="348029"/>
+            <a:ext cx="1655054" cy="244729"/>
           </a:xfrm>
           <a:prstGeom prst="roundRect">
             <a:avLst>
@@ -3778,7 +3768,7 @@
           <a:p>
             <a:pPr algn="ctr"/>
             <a:r>
-              <a:rPr lang="en-US" sz="1400" dirty="0" err="1" smtClean="0">
+              <a:rPr lang="en-US" sz="1400" dirty="0" err="1">
                 <a:solidFill>
                   <a:schemeClr val="tx1">
                     <a:lumMod val="50000"/>
@@ -3791,7 +3781,7 @@
               <a:t>s.</a:t>
             </a:r>
             <a:r>
-              <a:rPr lang="en-US" sz="1400" b="1" dirty="0" err="1" smtClean="0">
+              <a:rPr lang="en-US" sz="1400" b="1" dirty="0" err="1">
                 <a:solidFill>
                   <a:schemeClr val="tx1">
                     <a:lumMod val="50000"/>
@@ -3801,9 +3791,9 @@
                 <a:latin typeface="Consolas" pitchFamily="49" charset="0"/>
                 <a:cs typeface="Consolas" pitchFamily="49" charset="0"/>
               </a:rPr>
-              <a:t>ToMerge</a:t>
-            </a:r>
-            <a:endParaRPr lang="en-US" sz="1400" b="1" dirty="0" smtClean="0">
+              <a:t>FinalReview</a:t>
+            </a:r>
+            <a:endParaRPr lang="en-US" sz="1400" b="1" dirty="0">
               <a:solidFill>
                 <a:schemeClr val="tx1">
                   <a:lumMod val="50000"/>
@@ -3824,7 +3814,7 @@
         </p:nvSpPr>
         <p:spPr>
           <a:xfrm>
-            <a:off x="27683" y="384955"/>
+            <a:off x="27682" y="390682"/>
             <a:ext cx="159420" cy="159420"/>
           </a:xfrm>
           <a:prstGeom prst="flowChartConnector">
@@ -3879,8 +3869,8 @@
         </p:nvCxnSpPr>
         <p:spPr>
           <a:xfrm rot="5400000">
-            <a:off x="4953105" y="151525"/>
-            <a:ext cx="571477" cy="3175186"/>
+            <a:off x="4587986" y="-144532"/>
+            <a:ext cx="631736" cy="3897890"/>
           </a:xfrm>
           <a:prstGeom prst="curvedConnector2">
             <a:avLst/>
@@ -3914,23 +3904,22 @@
         <p:nvCxnSpPr>
           <p:cNvPr id="158" name="Curved Connector 157"/>
           <p:cNvCxnSpPr>
+            <a:stCxn id="179" idx="2"/>
             <a:endCxn id="171" idx="1"/>
           </p:cNvCxnSpPr>
           <p:nvPr/>
         </p:nvCxnSpPr>
         <p:spPr>
-          <a:xfrm>
-            <a:off x="441325" y="690714"/>
-            <a:ext cx="2971800" cy="1334143"/>
-          </a:xfrm>
-          <a:prstGeom prst="curvedConnector3">
-            <a:avLst>
-              <a:gd name="adj1" fmla="val 705"/>
-            </a:avLst>
+          <a:xfrm rot="16200000" flipH="1">
+            <a:off x="1053369" y="456865"/>
+            <a:ext cx="1527523" cy="1799307"/>
+          </a:xfrm>
+          <a:prstGeom prst="curvedConnector2">
+            <a:avLst/>
           </a:prstGeom>
           <a:ln w="28575">
             <a:solidFill>
-              <a:srgbClr val="0070C0"/>
+              <a:srgbClr val="7030A0"/>
             </a:solidFill>
             <a:headEnd type="none" w="med" len="med"/>
             <a:tailEnd type="triangle" w="med" len="med"/>
@@ -3962,15 +3951,15 @@
         </p:nvCxnSpPr>
         <p:spPr>
           <a:xfrm>
-            <a:off x="1488977" y="465625"/>
-            <a:ext cx="278802" cy="373562"/>
+            <a:off x="1488977" y="470394"/>
+            <a:ext cx="1145408" cy="359868"/>
           </a:xfrm>
           <a:prstGeom prst="curvedConnector2">
             <a:avLst/>
           </a:prstGeom>
           <a:ln w="28575">
             <a:solidFill>
-              <a:srgbClr val="0070C0"/>
+              <a:srgbClr val="7030A0"/>
             </a:solidFill>
             <a:headEnd type="none" w="med" len="med"/>
             <a:tailEnd type="triangle" w="med" len="med"/>
@@ -4002,8 +3991,8 @@
         </p:nvCxnSpPr>
         <p:spPr>
           <a:xfrm>
-            <a:off x="187103" y="464665"/>
-            <a:ext cx="158874" cy="960"/>
+            <a:off x="187103" y="470393"/>
+            <a:ext cx="158875" cy="1"/>
           </a:xfrm>
           <a:prstGeom prst="straightConnector1">
             <a:avLst/>
@@ -4035,14 +4024,14 @@
       </p:cxnSp>
       <p:sp>
         <p:nvSpPr>
-          <p:cNvPr id="177" name="Rounded Rectangle 176"/>
+          <p:cNvPr id="178" name="Rounded Rectangle 177"/>
           <p:cNvSpPr/>
           <p:nvPr/>
         </p:nvSpPr>
         <p:spPr>
           <a:xfrm>
-            <a:off x="1913979" y="1219994"/>
-            <a:ext cx="1676400" cy="249589"/>
+            <a:off x="4233482" y="348229"/>
+            <a:ext cx="1417517" cy="244529"/>
           </a:xfrm>
           <a:prstGeom prst="roundRect">
             <a:avLst>
@@ -4076,7 +4065,7 @@
           <a:p>
             <a:pPr algn="ctr"/>
             <a:r>
-              <a:rPr lang="en-US" sz="1400" b="1" smtClean="0">
+              <a:rPr lang="en-US" sz="1400" dirty="0" err="1">
                 <a:solidFill>
                   <a:schemeClr val="tx1">
                     <a:lumMod val="50000"/>
@@ -4086,9 +4075,22 @@
                 <a:latin typeface="Consolas" pitchFamily="49" charset="0"/>
                 <a:cs typeface="Consolas" pitchFamily="49" charset="0"/>
               </a:rPr>
-              <a:t>Assigned</a:t>
-            </a:r>
-            <a:endParaRPr lang="en-US" sz="1400" b="1" dirty="0" smtClean="0">
+              <a:t>s.</a:t>
+            </a:r>
+            <a:r>
+              <a:rPr lang="en-US" sz="1400" b="1" dirty="0" err="1">
+                <a:solidFill>
+                  <a:schemeClr val="tx1">
+                    <a:lumMod val="50000"/>
+                    <a:lumOff val="50000"/>
+                  </a:schemeClr>
+                </a:solidFill>
+                <a:latin typeface="Consolas" pitchFamily="49" charset="0"/>
+                <a:cs typeface="Consolas" pitchFamily="49" charset="0"/>
+              </a:rPr>
+              <a:t>ToReview</a:t>
+            </a:r>
+            <a:endParaRPr lang="en-US" sz="1400" b="1" dirty="0">
               <a:solidFill>
                 <a:schemeClr val="tx1">
                   <a:lumMod val="50000"/>
@@ -4103,14 +4105,14 @@
       </p:sp>
       <p:sp>
         <p:nvSpPr>
-          <p:cNvPr id="178" name="Rounded Rectangle 177"/>
+          <p:cNvPr id="179" name="Rounded Rectangle 178"/>
           <p:cNvSpPr/>
           <p:nvPr/>
         </p:nvSpPr>
         <p:spPr>
           <a:xfrm>
-            <a:off x="4233481" y="313064"/>
-            <a:ext cx="1417517" cy="244529"/>
+            <a:off x="345977" y="348029"/>
+            <a:ext cx="1143000" cy="244729"/>
           </a:xfrm>
           <a:prstGeom prst="roundRect">
             <a:avLst>
@@ -4139,12 +4141,12 @@
           </a:fontRef>
         </p:style>
         <p:txBody>
-          <a:bodyPr vert="horz" rtlCol="0" anchor="ctr" anchorCtr="0"/>
+          <a:bodyPr vert="horz" lIns="0" rIns="0" rtlCol="0" anchor="ctr" anchorCtr="0"/>
           <a:lstStyle/>
           <a:p>
             <a:pPr algn="ctr"/>
             <a:r>
-              <a:rPr lang="en-US" sz="1400" dirty="0" err="1" smtClean="0">
+              <a:rPr lang="en-US" sz="1400" b="1" dirty="0">
                 <a:solidFill>
                   <a:schemeClr val="tx1">
                     <a:lumMod val="50000"/>
@@ -4154,22 +4156,9 @@
                 <a:latin typeface="Consolas" pitchFamily="49" charset="0"/>
                 <a:cs typeface="Consolas" pitchFamily="49" charset="0"/>
               </a:rPr>
-              <a:t>s.</a:t>
-            </a:r>
-            <a:r>
-              <a:rPr lang="en-US" sz="1400" b="1" dirty="0" err="1" smtClean="0">
-                <a:solidFill>
-                  <a:schemeClr val="tx1">
-                    <a:lumMod val="50000"/>
-                    <a:lumOff val="50000"/>
-                  </a:schemeClr>
-                </a:solidFill>
-                <a:latin typeface="Consolas" pitchFamily="49" charset="0"/>
-                <a:cs typeface="Consolas" pitchFamily="49" charset="0"/>
-              </a:rPr>
-              <a:t>ToReview</a:t>
-            </a:r>
-            <a:endParaRPr lang="en-US" sz="1400" b="1" dirty="0">
+              <a:t>New</a:t>
+            </a:r>
+            <a:endParaRPr lang="en-US" sz="1400" dirty="0">
               <a:solidFill>
                 <a:schemeClr val="tx1">
                   <a:lumMod val="50000"/>
@@ -4184,96 +4173,13 @@
       </p:sp>
       <p:sp>
         <p:nvSpPr>
-          <p:cNvPr id="179" name="Rounded Rectangle 178"/>
-          <p:cNvSpPr/>
-          <p:nvPr/>
-        </p:nvSpPr>
-        <p:spPr>
-          <a:xfrm>
-            <a:off x="345977" y="240535"/>
-            <a:ext cx="1143000" cy="450179"/>
-          </a:xfrm>
-          <a:prstGeom prst="roundRect">
-            <a:avLst>
-              <a:gd name="adj" fmla="val 9190"/>
-            </a:avLst>
-          </a:prstGeom>
-          <a:solidFill>
-            <a:schemeClr val="bg1"/>
-          </a:solidFill>
-          <a:ln>
-            <a:noFill/>
-          </a:ln>
-        </p:spPr>
-        <p:style>
-          <a:lnRef idx="2">
-            <a:schemeClr val="accent2"/>
-          </a:lnRef>
-          <a:fillRef idx="1">
-            <a:schemeClr val="lt1"/>
-          </a:fillRef>
-          <a:effectRef idx="0">
-            <a:schemeClr val="accent2"/>
-          </a:effectRef>
-          <a:fontRef idx="minor">
-            <a:schemeClr val="dk1"/>
-          </a:fontRef>
-        </p:style>
-        <p:txBody>
-          <a:bodyPr vert="horz" lIns="0" rIns="0" rtlCol="0" anchor="ctr" anchorCtr="0"/>
-          <a:lstStyle/>
-          <a:p>
-            <a:pPr algn="ctr"/>
-            <a:r>
-              <a:rPr lang="en-US" sz="1400" b="1" dirty="0" smtClean="0">
-                <a:solidFill>
-                  <a:schemeClr val="tx1">
-                    <a:lumMod val="50000"/>
-                    <a:lumOff val="50000"/>
-                  </a:schemeClr>
-                </a:solidFill>
-                <a:latin typeface="Consolas" pitchFamily="49" charset="0"/>
-                <a:cs typeface="Consolas" pitchFamily="49" charset="0"/>
-              </a:rPr>
-              <a:t>New </a:t>
-            </a:r>
-            <a:br>
-              <a:rPr lang="en-US" sz="1400" b="1" dirty="0" smtClean="0">
-                <a:solidFill>
-                  <a:schemeClr val="tx1">
-                    <a:lumMod val="50000"/>
-                    <a:lumOff val="50000"/>
-                  </a:schemeClr>
-                </a:solidFill>
-                <a:latin typeface="Consolas" pitchFamily="49" charset="0"/>
-                <a:cs typeface="Consolas" pitchFamily="49" charset="0"/>
-              </a:rPr>
-            </a:br>
-            <a:r>
-              <a:rPr lang="en-US" sz="1400" dirty="0" smtClean="0">
-                <a:solidFill>
-                  <a:schemeClr val="tx1">
-                    <a:lumMod val="50000"/>
-                    <a:lumOff val="50000"/>
-                  </a:schemeClr>
-                </a:solidFill>
-                <a:latin typeface="Consolas" pitchFamily="49" charset="0"/>
-                <a:cs typeface="Consolas" pitchFamily="49" charset="0"/>
-              </a:rPr>
-              <a:t>[no status]</a:t>
-            </a:r>
-          </a:p>
-        </p:txBody>
-      </p:sp>
-      <p:sp>
-        <p:nvSpPr>
           <p:cNvPr id="192" name="TextBox 191"/>
           <p:cNvSpPr txBox="1"/>
           <p:nvPr/>
         </p:nvSpPr>
         <p:spPr>
           <a:xfrm>
-            <a:off x="123207" y="2226972"/>
+            <a:off x="1914748" y="2441205"/>
             <a:ext cx="533400" cy="323165"/>
           </a:xfrm>
           <a:prstGeom prst="rect">
@@ -4289,7 +4195,7 @@
           <a:p>
             <a:pPr algn="r"/>
             <a:r>
-              <a:rPr lang="en-US" b="1" dirty="0" err="1" smtClean="0">
+              <a:rPr lang="en-US" b="1" dirty="0" err="1">
                 <a:solidFill>
                   <a:srgbClr val="00B050"/>
                 </a:solidFill>
@@ -4312,7 +4218,7 @@
         </p:nvSpPr>
         <p:spPr>
           <a:xfrm>
-            <a:off x="1009590" y="2236377"/>
+            <a:off x="2728478" y="2438564"/>
             <a:ext cx="958774" cy="323165"/>
           </a:xfrm>
           <a:prstGeom prst="rect">
@@ -4328,7 +4234,7 @@
           <a:p>
             <a:pPr algn="r"/>
             <a:r>
-              <a:rPr lang="en-US" b="1" dirty="0" smtClean="0">
+              <a:rPr lang="en-US" b="1" dirty="0">
                 <a:solidFill>
                   <a:schemeClr val="accent6">
                     <a:lumMod val="75000"/>
@@ -4347,101 +4253,23 @@
           </a:p>
         </p:txBody>
       </p:sp>
-      <p:sp>
-        <p:nvSpPr>
-          <p:cNvPr id="194" name="TextBox 193"/>
-          <p:cNvSpPr txBox="1"/>
-          <p:nvPr/>
-        </p:nvSpPr>
-        <p:spPr>
-          <a:xfrm>
-            <a:off x="3622416" y="2255529"/>
-            <a:ext cx="1447800" cy="323165"/>
-          </a:xfrm>
-          <a:prstGeom prst="rect">
-            <a:avLst/>
-          </a:prstGeom>
-          <a:noFill/>
-        </p:spPr>
-        <p:txBody>
-          <a:bodyPr wrap="square" rtlCol="0">
-            <a:spAutoFit/>
-          </a:bodyPr>
-          <a:lstStyle/>
-          <a:p>
-            <a:pPr algn="r"/>
-            <a:r>
-              <a:rPr lang="en-US" b="1" dirty="0" smtClean="0">
-                <a:solidFill>
-                  <a:srgbClr val="0070C0"/>
-                </a:solidFill>
-              </a:rPr>
-              <a:t>Project Mentor</a:t>
-            </a:r>
-            <a:endParaRPr lang="en-SG" b="1" dirty="0">
-              <a:solidFill>
-                <a:srgbClr val="0070C0"/>
-              </a:solidFill>
-            </a:endParaRPr>
-          </a:p>
-        </p:txBody>
-      </p:sp>
-      <p:cxnSp>
-        <p:nvCxnSpPr>
-          <p:cNvPr id="61" name="Curved Connector 60"/>
-          <p:cNvCxnSpPr>
-            <a:stCxn id="135" idx="3"/>
-            <a:endCxn id="177" idx="0"/>
-          </p:cNvCxnSpPr>
-          <p:nvPr/>
-        </p:nvCxnSpPr>
-        <p:spPr>
-          <a:xfrm>
-            <a:off x="2618082" y="959067"/>
-            <a:ext cx="134097" cy="260927"/>
-          </a:xfrm>
-          <a:prstGeom prst="curvedConnector2">
-            <a:avLst/>
-          </a:prstGeom>
-          <a:ln w="28575">
-            <a:solidFill>
-              <a:srgbClr val="00B050"/>
-            </a:solidFill>
-            <a:headEnd type="none" w="med" len="med"/>
-            <a:tailEnd type="triangle" w="med" len="med"/>
-          </a:ln>
-        </p:spPr>
-        <p:style>
-          <a:lnRef idx="1">
-            <a:schemeClr val="accent1"/>
-          </a:lnRef>
-          <a:fillRef idx="0">
-            <a:schemeClr val="accent1"/>
-          </a:fillRef>
-          <a:effectRef idx="0">
-            <a:schemeClr val="accent1"/>
-          </a:effectRef>
-          <a:fontRef idx="minor">
-            <a:schemeClr val="tx1"/>
-          </a:fontRef>
-        </p:style>
-      </p:cxnSp>
       <p:cxnSp>
         <p:nvCxnSpPr>
           <p:cNvPr id="64" name="Curved Connector 63"/>
           <p:cNvCxnSpPr>
+            <a:stCxn id="135" idx="2"/>
             <a:endCxn id="171" idx="0"/>
           </p:cNvCxnSpPr>
           <p:nvPr/>
         </p:nvCxnSpPr>
         <p:spPr>
           <a:xfrm rot="16200000" flipH="1">
-            <a:off x="3158162" y="1531767"/>
-            <a:ext cx="426503" cy="321550"/>
+            <a:off x="2269518" y="1434889"/>
+            <a:ext cx="931196" cy="201462"/>
           </a:xfrm>
           <a:prstGeom prst="curvedConnector3">
             <a:avLst>
-              <a:gd name="adj1" fmla="val 63102"/>
+              <a:gd name="adj1" fmla="val 50000"/>
             </a:avLst>
           </a:prstGeom>
           <a:ln w="28575">
@@ -4477,7 +4305,7 @@
         </p:nvSpPr>
         <p:spPr>
           <a:xfrm>
-            <a:off x="3927377" y="384955"/>
+            <a:off x="3911933" y="1286194"/>
             <a:ext cx="159420" cy="159420"/>
           </a:xfrm>
           <a:prstGeom prst="flowChartConnector">
@@ -4526,13 +4354,14 @@
           <p:cNvPr id="115" name="Straight Arrow Connector 114"/>
           <p:cNvCxnSpPr>
             <a:stCxn id="114" idx="6"/>
+            <a:endCxn id="120" idx="1"/>
           </p:cNvCxnSpPr>
           <p:nvPr/>
         </p:nvCxnSpPr>
         <p:spPr>
-          <a:xfrm>
-            <a:off x="4086797" y="464665"/>
-            <a:ext cx="158874" cy="960"/>
+          <a:xfrm flipV="1">
+            <a:off x="4071353" y="1362546"/>
+            <a:ext cx="162128" cy="3359"/>
           </a:xfrm>
           <a:prstGeom prst="straightConnector1">
             <a:avLst/>
@@ -4570,7 +4399,7 @@
         </p:nvSpPr>
         <p:spPr>
           <a:xfrm>
-            <a:off x="4233481" y="1201381"/>
+            <a:off x="4233482" y="1236545"/>
             <a:ext cx="1417517" cy="252000"/>
           </a:xfrm>
           <a:prstGeom prst="roundRect">
@@ -4605,7 +4434,7 @@
           <a:p>
             <a:pPr algn="ctr"/>
             <a:r>
-              <a:rPr lang="en-US" sz="1400" dirty="0" err="1" smtClean="0">
+              <a:rPr lang="en-US" sz="1400" dirty="0" err="1">
                 <a:solidFill>
                   <a:schemeClr val="tx1">
                     <a:lumMod val="50000"/>
@@ -4618,7 +4447,7 @@
               <a:t>s.</a:t>
             </a:r>
             <a:r>
-              <a:rPr lang="en-US" sz="1400" b="1" dirty="0" err="1" smtClean="0">
+              <a:rPr lang="en-US" sz="1400" b="1" dirty="0" err="1">
                 <a:solidFill>
                   <a:schemeClr val="tx1">
                     <a:lumMod val="50000"/>
@@ -4630,7 +4459,7 @@
               </a:rPr>
               <a:t>Ongoing</a:t>
             </a:r>
-            <a:endParaRPr lang="en-US" sz="1400" b="1" dirty="0" smtClean="0">
+            <a:endParaRPr lang="en-US" sz="1400" b="1" dirty="0">
               <a:solidFill>
                 <a:schemeClr val="tx1">
                   <a:lumMod val="50000"/>
@@ -4647,17 +4476,20 @@
         <p:nvCxnSpPr>
           <p:cNvPr id="125" name="Curved Connector 124"/>
           <p:cNvCxnSpPr>
+            <a:stCxn id="135" idx="3"/>
             <a:endCxn id="114" idx="2"/>
           </p:cNvCxnSpPr>
           <p:nvPr/>
         </p:nvCxnSpPr>
         <p:spPr>
-          <a:xfrm rot="5400000" flipH="1" flipV="1">
-            <a:off x="3353097" y="645714"/>
-            <a:ext cx="755329" cy="393232"/>
-          </a:xfrm>
-          <a:prstGeom prst="curvedConnector2">
-            <a:avLst/>
+          <a:xfrm>
+            <a:off x="3402290" y="950142"/>
+            <a:ext cx="509643" cy="415762"/>
+          </a:xfrm>
+          <a:prstGeom prst="curvedConnector3">
+            <a:avLst>
+              <a:gd name="adj1" fmla="val 50000"/>
+            </a:avLst>
           </a:prstGeom>
           <a:ln w="28575">
             <a:solidFill>
@@ -4694,7 +4526,7 @@
         </p:nvCxnSpPr>
         <p:spPr>
           <a:xfrm flipV="1">
-            <a:off x="5650998" y="435229"/>
+            <a:off x="5650998" y="470393"/>
             <a:ext cx="374274" cy="100"/>
           </a:xfrm>
           <a:prstGeom prst="curvedConnector3">
@@ -4735,8 +4567,8 @@
         </p:nvSpPr>
         <p:spPr>
           <a:xfrm>
-            <a:off x="3557745" y="2024856"/>
-            <a:ext cx="1775707" cy="301136"/>
+            <a:off x="2919973" y="2129326"/>
+            <a:ext cx="924156" cy="301136"/>
           </a:xfrm>
           <a:prstGeom prst="roundRect">
             <a:avLst>
@@ -4766,7 +4598,6 @@
           <a:bodyPr vert="horz" lIns="0" rIns="0" rtlCol="0" anchor="ctr" anchorCtr="0"/>
           <a:lstStyle/>
           <a:p>
-            <a:pPr algn="ctr"/>
             <a:r>
               <a:rPr lang="en-US" sz="1400" b="1" dirty="0" smtClean="0">
                 <a:solidFill>
@@ -4780,32 +4611,32 @@
               </a:rPr>
               <a:t>Closed</a:t>
             </a:r>
-            <a:r>
-              <a:rPr lang="en-US" sz="1400" dirty="0" smtClean="0">
-                <a:solidFill>
-                  <a:schemeClr val="tx1">
-                    <a:lumMod val="50000"/>
-                    <a:lumOff val="50000"/>
-                  </a:schemeClr>
-                </a:solidFill>
-                <a:latin typeface="Consolas" pitchFamily="49" charset="0"/>
-                <a:cs typeface="Consolas" pitchFamily="49" charset="0"/>
-              </a:rPr>
-              <a:t>[no status]</a:t>
-            </a:r>
+            <a:endParaRPr lang="en-US" sz="1400" dirty="0">
+              <a:solidFill>
+                <a:schemeClr val="tx1">
+                  <a:lumMod val="50000"/>
+                  <a:lumOff val="50000"/>
+                </a:schemeClr>
+              </a:solidFill>
+              <a:latin typeface="Consolas" pitchFamily="49" charset="0"/>
+              <a:cs typeface="Consolas" pitchFamily="49" charset="0"/>
+            </a:endParaRPr>
           </a:p>
         </p:txBody>
       </p:sp>
       <p:cxnSp>
         <p:nvCxnSpPr>
           <p:cNvPr id="113" name="Straight Arrow Connector 112"/>
-          <p:cNvCxnSpPr/>
+          <p:cNvCxnSpPr>
+            <a:stCxn id="192" idx="3"/>
+            <a:endCxn id="193" idx="1"/>
+          </p:cNvCxnSpPr>
           <p:nvPr/>
         </p:nvCxnSpPr>
         <p:spPr>
-          <a:xfrm>
-            <a:off x="594360" y="2397960"/>
-            <a:ext cx="342756" cy="0"/>
+          <a:xfrm flipV="1">
+            <a:off x="2448148" y="2600147"/>
+            <a:ext cx="280330" cy="2641"/>
           </a:xfrm>
           <a:prstGeom prst="straightConnector1">
             <a:avLst/>
@@ -4836,13 +4667,16 @@
       <p:cxnSp>
         <p:nvCxnSpPr>
           <p:cNvPr id="164" name="Straight Arrow Connector 163"/>
-          <p:cNvCxnSpPr/>
+          <p:cNvCxnSpPr>
+            <a:stCxn id="193" idx="3"/>
+            <a:endCxn id="48" idx="1"/>
+          </p:cNvCxnSpPr>
           <p:nvPr/>
         </p:nvCxnSpPr>
         <p:spPr>
           <a:xfrm>
-            <a:off x="1906117" y="2417951"/>
-            <a:ext cx="342756" cy="0"/>
+            <a:off x="3687252" y="2600147"/>
+            <a:ext cx="280331" cy="2641"/>
           </a:xfrm>
           <a:prstGeom prst="straightConnector1">
             <a:avLst/>
@@ -4872,43 +4706,6 @@
           </a:fontRef>
         </p:style>
       </p:cxnSp>
-      <p:cxnSp>
-        <p:nvCxnSpPr>
-          <p:cNvPr id="165" name="Straight Arrow Connector 164"/>
-          <p:cNvCxnSpPr/>
-          <p:nvPr/>
-        </p:nvCxnSpPr>
-        <p:spPr>
-          <a:xfrm>
-            <a:off x="5051569" y="2428337"/>
-            <a:ext cx="342756" cy="0"/>
-          </a:xfrm>
-          <a:prstGeom prst="straightConnector1">
-            <a:avLst/>
-          </a:prstGeom>
-          <a:ln w="28575">
-            <a:solidFill>
-              <a:srgbClr val="0070C0"/>
-            </a:solidFill>
-            <a:headEnd type="none" w="med" len="med"/>
-            <a:tailEnd type="triangle" w="med" len="med"/>
-          </a:ln>
-        </p:spPr>
-        <p:style>
-          <a:lnRef idx="1">
-            <a:schemeClr val="accent1"/>
-          </a:lnRef>
-          <a:fillRef idx="0">
-            <a:schemeClr val="accent1"/>
-          </a:fillRef>
-          <a:effectRef idx="0">
-            <a:schemeClr val="accent1"/>
-          </a:effectRef>
-          <a:fontRef idx="minor">
-            <a:schemeClr val="tx1"/>
-          </a:fontRef>
-        </p:style>
-      </p:cxnSp>
       <p:sp>
         <p:nvSpPr>
           <p:cNvPr id="116" name="TextBox 115"/>
@@ -4916,8 +4713,8 @@
           <p:nvPr/>
         </p:nvSpPr>
         <p:spPr>
-          <a:xfrm rot="1653643">
-            <a:off x="335344" y="1572952"/>
+          <a:xfrm rot="3050600">
+            <a:off x="698320" y="1261688"/>
             <a:ext cx="685800" cy="323165"/>
           </a:xfrm>
           <a:prstGeom prst="rect">
@@ -4932,7 +4729,7 @@
           <a:lstStyle/>
           <a:p>
             <a:r>
-              <a:rPr lang="en-US" dirty="0" smtClean="0">
+              <a:rPr lang="en-US" dirty="0">
                 <a:solidFill>
                   <a:schemeClr val="bg1">
                     <a:lumMod val="50000"/>
@@ -4981,7 +4778,7 @@
         </p:blipFill>
         <p:spPr bwMode="auto">
           <a:xfrm>
-            <a:off x="3413125" y="1905794"/>
+            <a:off x="2716784" y="2001218"/>
             <a:ext cx="238125" cy="238125"/>
           </a:xfrm>
           <a:prstGeom prst="rect">
@@ -5025,12 +4822,14 @@
       <p:cxnSp>
         <p:nvCxnSpPr>
           <p:cNvPr id="1030" name="Straight Arrow Connector 1029"/>
-          <p:cNvCxnSpPr/>
+          <p:cNvCxnSpPr>
+            <a:stCxn id="120" idx="0"/>
+          </p:cNvCxnSpPr>
           <p:nvPr/>
         </p:nvCxnSpPr>
         <p:spPr>
           <a:xfrm flipV="1">
-            <a:off x="5013325" y="557593"/>
+            <a:off x="4942240" y="592757"/>
             <a:ext cx="0" cy="643789"/>
           </a:xfrm>
           <a:prstGeom prst="straightConnector1">
@@ -5067,7 +4866,7 @@
         </p:nvSpPr>
         <p:spPr>
           <a:xfrm>
-            <a:off x="1936193" y="96142"/>
+            <a:off x="2749540" y="131307"/>
             <a:ext cx="815985" cy="323165"/>
           </a:xfrm>
           <a:prstGeom prst="rect">
@@ -5082,7 +4881,7 @@
           <a:lstStyle/>
           <a:p>
             <a:r>
-              <a:rPr lang="en-US" b="1" dirty="0" smtClean="0">
+              <a:rPr lang="en-US" b="1" dirty="0">
                 <a:solidFill>
                   <a:schemeClr val="bg1"/>
                 </a:solidFill>
@@ -5105,7 +4904,7 @@
         </p:nvSpPr>
         <p:spPr>
           <a:xfrm>
-            <a:off x="6905433" y="61412"/>
+            <a:off x="6905434" y="96577"/>
             <a:ext cx="525337" cy="323165"/>
           </a:xfrm>
           <a:prstGeom prst="rect">
@@ -5120,7 +4919,7 @@
           <a:lstStyle/>
           <a:p>
             <a:r>
-              <a:rPr lang="en-US" b="1" dirty="0" smtClean="0">
+              <a:rPr lang="en-US" b="1" dirty="0">
                 <a:solidFill>
                   <a:schemeClr val="bg1"/>
                 </a:solidFill>
@@ -5135,46 +4934,6 @@
           </a:p>
         </p:txBody>
       </p:sp>
-      <p:cxnSp>
-        <p:nvCxnSpPr>
-          <p:cNvPr id="35" name="Curved Connector 34"/>
-          <p:cNvCxnSpPr>
-            <a:stCxn id="177" idx="1"/>
-            <a:endCxn id="135" idx="2"/>
-          </p:cNvCxnSpPr>
-          <p:nvPr/>
-        </p:nvCxnSpPr>
-        <p:spPr>
-          <a:xfrm rot="10800000">
-            <a:off x="1767779" y="1078947"/>
-            <a:ext cx="146200" cy="265842"/>
-          </a:xfrm>
-          <a:prstGeom prst="curvedConnector2">
-            <a:avLst/>
-          </a:prstGeom>
-          <a:ln w="28575">
-            <a:solidFill>
-              <a:srgbClr val="7030A0"/>
-            </a:solidFill>
-            <a:headEnd type="none" w="med" len="med"/>
-            <a:tailEnd type="triangle" w="med" len="med"/>
-          </a:ln>
-        </p:spPr>
-        <p:style>
-          <a:lnRef idx="1">
-            <a:schemeClr val="accent1"/>
-          </a:lnRef>
-          <a:fillRef idx="0">
-            <a:schemeClr val="accent1"/>
-          </a:fillRef>
-          <a:effectRef idx="0">
-            <a:schemeClr val="accent1"/>
-          </a:effectRef>
-          <a:fontRef idx="minor">
-            <a:schemeClr val="tx1"/>
-          </a:fontRef>
-        </p:style>
-      </p:cxnSp>
       <p:cxnSp>
         <p:nvCxnSpPr>
           <p:cNvPr id="37" name="Straight Arrow Connector 36"/>
@@ -5183,7 +4942,7 @@
         </p:nvCxnSpPr>
         <p:spPr>
           <a:xfrm>
-            <a:off x="4784725" y="557593"/>
+            <a:off x="4784725" y="592757"/>
             <a:ext cx="0" cy="643788"/>
           </a:xfrm>
           <a:prstGeom prst="straightConnector1">
@@ -5222,8 +4981,8 @@
         </p:nvSpPr>
         <p:spPr>
           <a:xfrm>
-            <a:off x="5972546" y="1201381"/>
-            <a:ext cx="1707780" cy="251999"/>
+            <a:off x="6025272" y="1236546"/>
+            <a:ext cx="1655054" cy="251999"/>
           </a:xfrm>
           <a:prstGeom prst="roundRect">
             <a:avLst>
@@ -5257,7 +5016,7 @@
           <a:p>
             <a:pPr algn="ctr"/>
             <a:r>
-              <a:rPr lang="en-US" sz="1400" dirty="0" err="1" smtClean="0">
+              <a:rPr lang="en-US" sz="1400" dirty="0" err="1">
                 <a:solidFill>
                   <a:schemeClr val="tx1">
                     <a:lumMod val="50000"/>
@@ -5267,10 +5026,10 @@
                 <a:latin typeface="Consolas" pitchFamily="49" charset="0"/>
                 <a:cs typeface="Consolas" pitchFamily="49" charset="0"/>
               </a:rPr>
-              <a:t>s.m</a:t>
-            </a:r>
-            <a:r>
-              <a:rPr lang="en-US" sz="1400" b="1" dirty="0" err="1" smtClean="0">
+              <a:t>s.</a:t>
+            </a:r>
+            <a:r>
+              <a:rPr lang="en-US" sz="1400" b="1" dirty="0" err="1">
                 <a:solidFill>
                   <a:schemeClr val="tx1">
                     <a:lumMod val="50000"/>
@@ -5280,9 +5039,9 @@
                 <a:latin typeface="Consolas" pitchFamily="49" charset="0"/>
                 <a:cs typeface="Consolas" pitchFamily="49" charset="0"/>
               </a:rPr>
-              <a:t>ergeApproved</a:t>
-            </a:r>
-            <a:endParaRPr lang="en-US" sz="1400" b="1" dirty="0" smtClean="0">
+              <a:t>ToMerge</a:t>
+            </a:r>
+            <a:endParaRPr lang="en-US" sz="1400" b="1" dirty="0">
               <a:solidFill>
                 <a:schemeClr val="tx1">
                   <a:lumMod val="50000"/>
@@ -5303,7 +5062,7 @@
         </p:nvCxnSpPr>
         <p:spPr>
           <a:xfrm flipV="1">
-            <a:off x="5650998" y="596604"/>
+            <a:off x="5627937" y="602291"/>
             <a:ext cx="580224" cy="626856"/>
           </a:xfrm>
           <a:prstGeom prst="straightConnector1">
@@ -5340,7 +5099,7 @@
         </p:nvCxnSpPr>
         <p:spPr>
           <a:xfrm flipH="1">
-            <a:off x="5394325" y="544375"/>
+            <a:off x="5398649" y="579539"/>
             <a:ext cx="608066" cy="657006"/>
           </a:xfrm>
           <a:prstGeom prst="straightConnector1">
@@ -5348,7 +5107,7 @@
           </a:prstGeom>
           <a:ln w="28575">
             <a:solidFill>
-              <a:srgbClr val="0070C0"/>
+              <a:srgbClr val="7030A0"/>
             </a:solidFill>
             <a:headEnd type="none" w="med" len="med"/>
             <a:tailEnd type="triangle" w="med" len="med"/>
@@ -5372,12 +5131,15 @@
       <p:cxnSp>
         <p:nvCxnSpPr>
           <p:cNvPr id="83" name="Straight Arrow Connector 82"/>
-          <p:cNvCxnSpPr/>
+          <p:cNvCxnSpPr>
+            <a:stCxn id="139" idx="2"/>
+            <a:endCxn id="57" idx="0"/>
+          </p:cNvCxnSpPr>
           <p:nvPr/>
         </p:nvCxnSpPr>
         <p:spPr>
           <a:xfrm>
-            <a:off x="6826436" y="557593"/>
+            <a:off x="6852799" y="592757"/>
             <a:ext cx="0" cy="643788"/>
           </a:xfrm>
           <a:prstGeom prst="straightConnector1">
@@ -5385,7 +5147,7 @@
           </a:prstGeom>
           <a:ln w="28575">
             <a:solidFill>
-              <a:srgbClr val="0070C0"/>
+              <a:srgbClr val="7030A0"/>
             </a:solidFill>
             <a:headEnd type="none" w="med" len="med"/>
             <a:tailEnd type="triangle" w="med" len="med"/>
@@ -5417,12 +5179,12 @@
         </p:nvCxnSpPr>
         <p:spPr>
           <a:xfrm rot="5400000">
-            <a:off x="4011008" y="974561"/>
-            <a:ext cx="452413" cy="1410052"/>
+            <a:off x="3632708" y="691684"/>
+            <a:ext cx="512673" cy="2106394"/>
           </a:xfrm>
           <a:prstGeom prst="curvedConnector3">
             <a:avLst>
-              <a:gd name="adj1" fmla="val 81441"/>
+              <a:gd name="adj1" fmla="val 50000"/>
             </a:avLst>
           </a:prstGeom>
           <a:ln w="28575">
@@ -5448,108 +5210,18 @@
           </a:fontRef>
         </p:style>
       </p:cxnSp>
-      <p:sp>
-        <p:nvSpPr>
-          <p:cNvPr id="92" name="TextBox 91"/>
-          <p:cNvSpPr txBox="1"/>
-          <p:nvPr/>
-        </p:nvSpPr>
-        <p:spPr>
-          <a:xfrm>
-            <a:off x="3595179" y="1595228"/>
-            <a:ext cx="1057275" cy="230832"/>
-          </a:xfrm>
-          <a:prstGeom prst="rect">
-            <a:avLst/>
-          </a:prstGeom>
-          <a:noFill/>
-        </p:spPr>
-        <p:txBody>
-          <a:bodyPr wrap="square" rtlCol="0">
-            <a:spAutoFit/>
-          </a:bodyPr>
-          <a:lstStyle/>
-          <a:p>
-            <a:pPr algn="r"/>
-            <a:r>
-              <a:rPr lang="en-US" sz="900" dirty="0" smtClean="0">
-                <a:solidFill>
-                  <a:schemeClr val="bg1">
-                    <a:lumMod val="50000"/>
-                  </a:schemeClr>
-                </a:solidFill>
-              </a:rPr>
-              <a:t>Abandoned by </a:t>
-            </a:r>
-            <a:r>
-              <a:rPr lang="en-US" sz="900" dirty="0" err="1" smtClean="0">
-                <a:solidFill>
-                  <a:schemeClr val="bg1">
-                    <a:lumMod val="50000"/>
-                  </a:schemeClr>
-                </a:solidFill>
-              </a:rPr>
-              <a:t>dev</a:t>
-            </a:r>
-            <a:endParaRPr lang="en-SG" sz="900" dirty="0">
-              <a:solidFill>
-                <a:schemeClr val="bg1">
-                  <a:lumMod val="50000"/>
-                </a:schemeClr>
-              </a:solidFill>
-            </a:endParaRPr>
-          </a:p>
-        </p:txBody>
-      </p:sp>
-      <p:sp>
-        <p:nvSpPr>
-          <p:cNvPr id="99" name="TextBox 98"/>
-          <p:cNvSpPr txBox="1"/>
-          <p:nvPr/>
-        </p:nvSpPr>
-        <p:spPr>
-          <a:xfrm>
-            <a:off x="2259718" y="2246043"/>
-            <a:ext cx="984919" cy="323165"/>
-          </a:xfrm>
-          <a:prstGeom prst="rect">
-            <a:avLst/>
-          </a:prstGeom>
-          <a:noFill/>
-        </p:spPr>
-        <p:txBody>
-          <a:bodyPr wrap="square" rtlCol="0">
-            <a:spAutoFit/>
-          </a:bodyPr>
-          <a:lstStyle/>
-          <a:p>
-            <a:pPr algn="r"/>
-            <a:r>
-              <a:rPr lang="en-US" b="1" dirty="0" smtClean="0">
-                <a:solidFill>
-                  <a:srgbClr val="7030A0"/>
-                </a:solidFill>
-              </a:rPr>
-              <a:t>Area Lead</a:t>
-            </a:r>
-            <a:endParaRPr lang="en-SG" b="1" dirty="0">
-              <a:solidFill>
-                <a:srgbClr val="7030A0"/>
-              </a:solidFill>
-            </a:endParaRPr>
-          </a:p>
-        </p:txBody>
-      </p:sp>
       <p:cxnSp>
         <p:nvCxnSpPr>
           <p:cNvPr id="100" name="Straight Arrow Connector 99"/>
-          <p:cNvCxnSpPr/>
+          <p:cNvCxnSpPr>
+            <a:stCxn id="48" idx="3"/>
+          </p:cNvCxnSpPr>
           <p:nvPr/>
         </p:nvCxnSpPr>
         <p:spPr>
-          <a:xfrm>
-            <a:off x="3241747" y="2417951"/>
-            <a:ext cx="342756" cy="0"/>
+          <a:xfrm flipV="1">
+            <a:off x="5303044" y="2600147"/>
+            <a:ext cx="282723" cy="2641"/>
           </a:xfrm>
           <a:prstGeom prst="straightConnector1">
             <a:avLst/>
@@ -5579,14 +5251,14 @@
       </p:cxnSp>
       <p:sp>
         <p:nvSpPr>
-          <p:cNvPr id="105" name="TextBox 104"/>
+          <p:cNvPr id="48" name="TextBox 47"/>
           <p:cNvSpPr txBox="1"/>
           <p:nvPr/>
         </p:nvSpPr>
         <p:spPr>
           <a:xfrm>
-            <a:off x="776448" y="1142324"/>
-            <a:ext cx="1057275" cy="230832"/>
+            <a:off x="3967583" y="2441205"/>
+            <a:ext cx="1335461" cy="323165"/>
           </a:xfrm>
           <a:prstGeom prst="rect">
             <a:avLst/>
@@ -5601,26 +5273,223 @@
           <a:p>
             <a:pPr algn="r"/>
             <a:r>
-              <a:rPr lang="en-US" sz="900" dirty="0" smtClean="0">
+              <a:rPr lang="en-US" b="1" dirty="0">
+                <a:solidFill>
+                  <a:srgbClr val="7030A0"/>
+                </a:solidFill>
+              </a:rPr>
+              <a:t>Team Member</a:t>
+            </a:r>
+            <a:endParaRPr lang="en-SG" b="1" dirty="0">
+              <a:solidFill>
+                <a:srgbClr val="7030A0"/>
+              </a:solidFill>
+            </a:endParaRPr>
+          </a:p>
+        </p:txBody>
+      </p:sp>
+      <p:cxnSp>
+        <p:nvCxnSpPr>
+          <p:cNvPr id="84" name="Curved Connector 83"/>
+          <p:cNvCxnSpPr>
+            <a:stCxn id="135" idx="1"/>
+            <a:endCxn id="171" idx="0"/>
+          </p:cNvCxnSpPr>
+          <p:nvPr/>
+        </p:nvCxnSpPr>
+        <p:spPr>
+          <a:xfrm rot="10800000" flipH="1" flipV="1">
+            <a:off x="1866479" y="950142"/>
+            <a:ext cx="969367" cy="1051076"/>
+          </a:xfrm>
+          <a:prstGeom prst="curvedConnector4">
+            <a:avLst>
+              <a:gd name="adj1" fmla="val -23582"/>
+              <a:gd name="adj2" fmla="val 80758"/>
+            </a:avLst>
+          </a:prstGeom>
+          <a:ln w="28575">
+            <a:solidFill>
+              <a:srgbClr val="7030A0"/>
+            </a:solidFill>
+            <a:headEnd type="none" w="med" len="med"/>
+            <a:tailEnd type="triangle" w="med" len="med"/>
+          </a:ln>
+        </p:spPr>
+        <p:style>
+          <a:lnRef idx="1">
+            <a:schemeClr val="accent1"/>
+          </a:lnRef>
+          <a:fillRef idx="0">
+            <a:schemeClr val="accent1"/>
+          </a:fillRef>
+          <a:effectRef idx="0">
+            <a:schemeClr val="accent1"/>
+          </a:effectRef>
+          <a:fontRef idx="minor">
+            <a:schemeClr val="tx1"/>
+          </a:fontRef>
+        </p:style>
+      </p:cxnSp>
+      <p:sp>
+        <p:nvSpPr>
+          <p:cNvPr id="97" name="TextBox 96"/>
+          <p:cNvSpPr txBox="1"/>
+          <p:nvPr/>
+        </p:nvSpPr>
+        <p:spPr>
+          <a:xfrm>
+            <a:off x="2651125" y="1192897"/>
+            <a:ext cx="685800" cy="323165"/>
+          </a:xfrm>
+          <a:prstGeom prst="rect">
+            <a:avLst/>
+          </a:prstGeom>
+          <a:noFill/>
+        </p:spPr>
+        <p:txBody>
+          <a:bodyPr wrap="square" rtlCol="0">
+            <a:spAutoFit/>
+          </a:bodyPr>
+          <a:lstStyle/>
+          <a:p>
+            <a:r>
+              <a:rPr lang="en-US" dirty="0">
                 <a:solidFill>
                   <a:schemeClr val="bg1">
                     <a:lumMod val="50000"/>
                   </a:schemeClr>
                 </a:solidFill>
               </a:rPr>
-              <a:t>Abandoned by </a:t>
-            </a:r>
-            <a:r>
-              <a:rPr lang="en-US" sz="900" dirty="0" err="1" smtClean="0">
+              <a:t>Fixed</a:t>
+            </a:r>
+            <a:endParaRPr lang="en-SG" dirty="0">
+              <a:solidFill>
+                <a:schemeClr val="bg1">
+                  <a:lumMod val="50000"/>
+                </a:schemeClr>
+              </a:solidFill>
+            </a:endParaRPr>
+          </a:p>
+        </p:txBody>
+      </p:sp>
+      <p:sp>
+        <p:nvSpPr>
+          <p:cNvPr id="98" name="TextBox 97"/>
+          <p:cNvSpPr txBox="1"/>
+          <p:nvPr/>
+        </p:nvSpPr>
+        <p:spPr>
+          <a:xfrm>
+            <a:off x="1622115" y="1192897"/>
+            <a:ext cx="952810" cy="323165"/>
+          </a:xfrm>
+          <a:prstGeom prst="rect">
+            <a:avLst/>
+          </a:prstGeom>
+          <a:noFill/>
+        </p:spPr>
+        <p:txBody>
+          <a:bodyPr wrap="square" rtlCol="0">
+            <a:spAutoFit/>
+          </a:bodyPr>
+          <a:lstStyle/>
+          <a:p>
+            <a:r>
+              <a:rPr lang="en-US" dirty="0">
                 <a:solidFill>
                   <a:schemeClr val="bg1">
                     <a:lumMod val="50000"/>
                   </a:schemeClr>
                 </a:solidFill>
               </a:rPr>
-              <a:t>dev</a:t>
-            </a:r>
-            <a:endParaRPr lang="en-SG" sz="900" dirty="0">
+              <a:t>Outdated</a:t>
+            </a:r>
+            <a:endParaRPr lang="en-SG" dirty="0">
+              <a:solidFill>
+                <a:schemeClr val="bg1">
+                  <a:lumMod val="50000"/>
+                </a:schemeClr>
+              </a:solidFill>
+            </a:endParaRPr>
+          </a:p>
+        </p:txBody>
+      </p:sp>
+      <p:sp>
+        <p:nvSpPr>
+          <p:cNvPr id="101" name="TextBox 100"/>
+          <p:cNvSpPr txBox="1"/>
+          <p:nvPr/>
+        </p:nvSpPr>
+        <p:spPr>
+          <a:xfrm>
+            <a:off x="3645394" y="1726297"/>
+            <a:ext cx="1149194" cy="323165"/>
+          </a:xfrm>
+          <a:prstGeom prst="rect">
+            <a:avLst/>
+          </a:prstGeom>
+          <a:noFill/>
+        </p:spPr>
+        <p:txBody>
+          <a:bodyPr wrap="square" rtlCol="0">
+            <a:spAutoFit/>
+          </a:bodyPr>
+          <a:lstStyle/>
+          <a:p>
+            <a:r>
+              <a:rPr lang="en-US" dirty="0">
+                <a:solidFill>
+                  <a:schemeClr val="bg1">
+                    <a:lumMod val="50000"/>
+                  </a:schemeClr>
+                </a:solidFill>
+              </a:rPr>
+              <a:t>Abandoned</a:t>
+            </a:r>
+            <a:endParaRPr lang="en-SG" dirty="0">
+              <a:solidFill>
+                <a:schemeClr val="bg1">
+                  <a:lumMod val="50000"/>
+                </a:schemeClr>
+              </a:solidFill>
+            </a:endParaRPr>
+          </a:p>
+        </p:txBody>
+      </p:sp>
+      <p:sp>
+        <p:nvSpPr>
+          <p:cNvPr id="102" name="TextBox 101"/>
+          <p:cNvSpPr txBox="1"/>
+          <p:nvPr/>
+        </p:nvSpPr>
+        <p:spPr>
+          <a:xfrm>
+            <a:off x="5863185" y="1820862"/>
+            <a:ext cx="826540" cy="323165"/>
+          </a:xfrm>
+          <a:prstGeom prst="rect">
+            <a:avLst/>
+          </a:prstGeom>
+          <a:noFill/>
+        </p:spPr>
+        <p:txBody>
+          <a:bodyPr wrap="square" rtlCol="0">
+            <a:spAutoFit/>
+          </a:bodyPr>
+          <a:lstStyle/>
+          <a:p>
+            <a:r>
+              <a:rPr lang="en-US" dirty="0">
+                <a:solidFill>
+                  <a:schemeClr val="bg1">
+                    <a:lumMod val="50000"/>
+                  </a:schemeClr>
+                </a:solidFill>
+              </a:rPr>
+              <a:t>Merged</a:t>
+            </a:r>
+            <a:endParaRPr lang="en-SG" dirty="0">
               <a:solidFill>
                 <a:schemeClr val="bg1">
                   <a:lumMod val="50000"/>

</xml_diff>

<commit_message>
[#8565] Update workflow/process documents (#8626)
</commit_message>
<xml_diff>
--- a/docs/images/IssueLifecycle.pptx
+++ b/docs/images/IssueLifecycle.pptx
@@ -10,7 +10,7 @@
   <p:sldIdLst>
     <p:sldId id="256" r:id="rId2"/>
   </p:sldIdLst>
-  <p:sldSz cx="7740650" cy="2592388"/>
+  <p:sldSz cx="7740650" cy="2879725"/>
   <p:notesSz cx="6858000" cy="9144000"/>
   <p:defaultTextStyle>
     <a:defPPr>
@@ -110,12 +110,12 @@
   <p:extLst>
     <p:ext uri="{EFAFB233-063F-42B5-8137-9DF3F51BA10A}">
       <p15:sldGuideLst xmlns:p15="http://schemas.microsoft.com/office/powerpoint/2012/main">
-        <p15:guide id="1" orient="horz" pos="817">
+        <p15:guide id="1" orient="horz" pos="908" userDrawn="1">
           <p15:clr>
             <a:srgbClr val="A4A3A4"/>
           </p15:clr>
         </p15:guide>
-        <p15:guide id="2" pos="2439">
+        <p15:guide id="2" pos="2439" userDrawn="1">
           <p15:clr>
             <a:srgbClr val="A4A3A4"/>
           </p15:clr>
@@ -208,7 +208,7 @@
           <a:p>
             <a:fld id="{EB56B9F1-9881-483D-AC17-B3C6E9A32E68}" type="datetimeFigureOut">
               <a:rPr lang="en-SG" smtClean="0"/>
-              <a:t>10/2/2016</a:t>
+              <a:t>18/3/2018</a:t>
             </a:fld>
             <a:endParaRPr lang="en-SG"/>
           </a:p>
@@ -226,8 +226,8 @@
         </p:nvSpPr>
         <p:spPr>
           <a:xfrm>
-            <a:off x="-1689100" y="685800"/>
-            <a:ext cx="10236200" cy="3429000"/>
+            <a:off x="-1179513" y="685800"/>
+            <a:ext cx="9217026" cy="3429000"/>
           </a:xfrm>
           <a:prstGeom prst="rect">
             <a:avLst/>
@@ -505,8 +505,8 @@
         </p:nvSpPr>
         <p:spPr>
           <a:xfrm>
-            <a:off x="-1689100" y="685800"/>
-            <a:ext cx="10236200" cy="3429000"/>
+            <a:off x="-1179513" y="685800"/>
+            <a:ext cx="9217026" cy="3429000"/>
           </a:xfrm>
         </p:spPr>
       </p:sp>
@@ -594,8 +594,8 @@
         </p:nvSpPr>
         <p:spPr>
           <a:xfrm>
-            <a:off x="580550" y="805322"/>
-            <a:ext cx="6579553" cy="555684"/>
+            <a:off x="580550" y="894583"/>
+            <a:ext cx="6579553" cy="617275"/>
           </a:xfrm>
         </p:spPr>
         <p:txBody>
@@ -622,8 +622,8 @@
         </p:nvSpPr>
         <p:spPr>
           <a:xfrm>
-            <a:off x="1161098" y="1469022"/>
-            <a:ext cx="5418455" cy="662499"/>
+            <a:off x="1161099" y="1631847"/>
+            <a:ext cx="5418455" cy="735930"/>
           </a:xfrm>
         </p:spPr>
         <p:txBody>
@@ -747,7 +747,7 @@
             <a:fld id="{1D8BD707-D9CF-40AE-B4C6-C98DA3205C09}" type="datetimeFigureOut">
               <a:rPr lang="en-US" smtClean="0"/>
               <a:pPr/>
-              <a:t>2/10/2016</a:t>
+              <a:t>3/18/2018</a:t>
             </a:fld>
             <a:endParaRPr lang="en-US"/>
           </a:p>
@@ -914,7 +914,7 @@
             <a:fld id="{1D8BD707-D9CF-40AE-B4C6-C98DA3205C09}" type="datetimeFigureOut">
               <a:rPr lang="en-US" smtClean="0"/>
               <a:pPr/>
-              <a:t>2/10/2016</a:t>
+              <a:t>3/18/2018</a:t>
             </a:fld>
             <a:endParaRPr lang="en-US"/>
           </a:p>
@@ -1000,8 +1000,8 @@
         </p:nvSpPr>
         <p:spPr>
           <a:xfrm>
-            <a:off x="5611975" y="103817"/>
-            <a:ext cx="1741647" cy="2211930"/>
+            <a:off x="5611976" y="115324"/>
+            <a:ext cx="1741647" cy="2457098"/>
           </a:xfrm>
         </p:spPr>
         <p:txBody>
@@ -1028,8 +1028,8 @@
         </p:nvSpPr>
         <p:spPr>
           <a:xfrm>
-            <a:off x="387034" y="103817"/>
-            <a:ext cx="5095928" cy="2211930"/>
+            <a:off x="387034" y="115324"/>
+            <a:ext cx="5095928" cy="2457098"/>
           </a:xfrm>
         </p:spPr>
         <p:txBody>
@@ -1091,7 +1091,7 @@
             <a:fld id="{1D8BD707-D9CF-40AE-B4C6-C98DA3205C09}" type="datetimeFigureOut">
               <a:rPr lang="en-US" smtClean="0"/>
               <a:pPr/>
-              <a:t>2/10/2016</a:t>
+              <a:t>3/18/2018</a:t>
             </a:fld>
             <a:endParaRPr lang="en-US"/>
           </a:p>
@@ -1258,7 +1258,7 @@
             <a:fld id="{1D8BD707-D9CF-40AE-B4C6-C98DA3205C09}" type="datetimeFigureOut">
               <a:rPr lang="en-US" smtClean="0"/>
               <a:pPr/>
-              <a:t>2/10/2016</a:t>
+              <a:t>3/18/2018</a:t>
             </a:fld>
             <a:endParaRPr lang="en-US"/>
           </a:p>
@@ -1344,8 +1344,8 @@
         </p:nvSpPr>
         <p:spPr>
           <a:xfrm>
-            <a:off x="611459" y="1665852"/>
-            <a:ext cx="6579553" cy="514877"/>
+            <a:off x="611460" y="1850494"/>
+            <a:ext cx="6579553" cy="571945"/>
           </a:xfrm>
         </p:spPr>
         <p:txBody>
@@ -1376,8 +1376,8 @@
         </p:nvSpPr>
         <p:spPr>
           <a:xfrm>
-            <a:off x="611459" y="1098766"/>
-            <a:ext cx="6579553" cy="567085"/>
+            <a:off x="611460" y="1220552"/>
+            <a:ext cx="6579553" cy="629940"/>
           </a:xfrm>
         </p:spPr>
         <p:txBody>
@@ -1501,7 +1501,7 @@
             <a:fld id="{1D8BD707-D9CF-40AE-B4C6-C98DA3205C09}" type="datetimeFigureOut">
               <a:rPr lang="en-US" smtClean="0"/>
               <a:pPr/>
-              <a:t>2/10/2016</a:t>
+              <a:t>3/18/2018</a:t>
             </a:fld>
             <a:endParaRPr lang="en-US"/>
           </a:p>
@@ -1610,8 +1610,8 @@
         </p:nvSpPr>
         <p:spPr>
           <a:xfrm>
-            <a:off x="387032" y="604894"/>
-            <a:ext cx="3418787" cy="1710857"/>
+            <a:off x="387033" y="671940"/>
+            <a:ext cx="3418787" cy="1900486"/>
           </a:xfrm>
         </p:spPr>
         <p:txBody>
@@ -1695,8 +1695,8 @@
         </p:nvSpPr>
         <p:spPr>
           <a:xfrm>
-            <a:off x="3934831" y="604894"/>
-            <a:ext cx="3418787" cy="1710857"/>
+            <a:off x="3934832" y="671940"/>
+            <a:ext cx="3418787" cy="1900486"/>
           </a:xfrm>
         </p:spPr>
         <p:txBody>
@@ -1786,7 +1786,7 @@
             <a:fld id="{1D8BD707-D9CF-40AE-B4C6-C98DA3205C09}" type="datetimeFigureOut">
               <a:rPr lang="en-US" smtClean="0"/>
               <a:pPr/>
-              <a:t>2/10/2016</a:t>
+              <a:t>3/18/2018</a:t>
             </a:fld>
             <a:endParaRPr lang="en-US"/>
           </a:p>
@@ -1899,8 +1899,8 @@
         </p:nvSpPr>
         <p:spPr>
           <a:xfrm>
-            <a:off x="387033" y="580289"/>
-            <a:ext cx="3420131" cy="241835"/>
+            <a:off x="387034" y="644608"/>
+            <a:ext cx="3420131" cy="268640"/>
           </a:xfrm>
         </p:spPr>
         <p:txBody>
@@ -1964,8 +1964,8 @@
         </p:nvSpPr>
         <p:spPr>
           <a:xfrm>
-            <a:off x="387033" y="822125"/>
-            <a:ext cx="3420131" cy="1493624"/>
+            <a:off x="387034" y="913248"/>
+            <a:ext cx="3420131" cy="1659175"/>
           </a:xfrm>
         </p:spPr>
         <p:txBody>
@@ -2049,8 +2049,8 @@
         </p:nvSpPr>
         <p:spPr>
           <a:xfrm>
-            <a:off x="3932146" y="580289"/>
-            <a:ext cx="3421475" cy="241835"/>
+            <a:off x="3932147" y="644608"/>
+            <a:ext cx="3421475" cy="268640"/>
           </a:xfrm>
         </p:spPr>
         <p:txBody>
@@ -2114,8 +2114,8 @@
         </p:nvSpPr>
         <p:spPr>
           <a:xfrm>
-            <a:off x="3932146" y="822125"/>
-            <a:ext cx="3421475" cy="1493624"/>
+            <a:off x="3932147" y="913248"/>
+            <a:ext cx="3421475" cy="1659175"/>
           </a:xfrm>
         </p:spPr>
         <p:txBody>
@@ -2205,7 +2205,7 @@
             <a:fld id="{1D8BD707-D9CF-40AE-B4C6-C98DA3205C09}" type="datetimeFigureOut">
               <a:rPr lang="en-US" smtClean="0"/>
               <a:pPr/>
-              <a:t>2/10/2016</a:t>
+              <a:t>3/18/2018</a:t>
             </a:fld>
             <a:endParaRPr lang="en-US"/>
           </a:p>
@@ -2320,7 +2320,7 @@
             <a:fld id="{1D8BD707-D9CF-40AE-B4C6-C98DA3205C09}" type="datetimeFigureOut">
               <a:rPr lang="en-US" smtClean="0"/>
               <a:pPr/>
-              <a:t>2/10/2016</a:t>
+              <a:t>3/18/2018</a:t>
             </a:fld>
             <a:endParaRPr lang="en-US"/>
           </a:p>
@@ -2412,7 +2412,7 @@
             <a:fld id="{1D8BD707-D9CF-40AE-B4C6-C98DA3205C09}" type="datetimeFigureOut">
               <a:rPr lang="en-US" smtClean="0"/>
               <a:pPr/>
-              <a:t>2/10/2016</a:t>
+              <a:t>3/18/2018</a:t>
             </a:fld>
             <a:endParaRPr lang="en-US"/>
           </a:p>
@@ -2498,8 +2498,8 @@
         </p:nvSpPr>
         <p:spPr>
           <a:xfrm>
-            <a:off x="387035" y="103218"/>
-            <a:ext cx="2546621" cy="439265"/>
+            <a:off x="387036" y="114659"/>
+            <a:ext cx="2546621" cy="487953"/>
           </a:xfrm>
         </p:spPr>
         <p:txBody>
@@ -2530,8 +2530,8 @@
         </p:nvSpPr>
         <p:spPr>
           <a:xfrm>
-            <a:off x="3026379" y="103218"/>
-            <a:ext cx="4327238" cy="2212531"/>
+            <a:off x="3026379" y="114659"/>
+            <a:ext cx="4327238" cy="2457765"/>
           </a:xfrm>
         </p:spPr>
         <p:txBody>
@@ -2615,8 +2615,8 @@
         </p:nvSpPr>
         <p:spPr>
           <a:xfrm>
-            <a:off x="387035" y="542483"/>
-            <a:ext cx="2546621" cy="1773265"/>
+            <a:off x="387036" y="602612"/>
+            <a:ext cx="2546621" cy="1969811"/>
           </a:xfrm>
         </p:spPr>
         <p:txBody>
@@ -2686,7 +2686,7 @@
             <a:fld id="{1D8BD707-D9CF-40AE-B4C6-C98DA3205C09}" type="datetimeFigureOut">
               <a:rPr lang="en-US" smtClean="0"/>
               <a:pPr/>
-              <a:t>2/10/2016</a:t>
+              <a:t>3/18/2018</a:t>
             </a:fld>
             <a:endParaRPr lang="en-US"/>
           </a:p>
@@ -2772,8 +2772,8 @@
         </p:nvSpPr>
         <p:spPr>
           <a:xfrm>
-            <a:off x="1517222" y="1814675"/>
-            <a:ext cx="4644390" cy="214232"/>
+            <a:off x="1517222" y="2015811"/>
+            <a:ext cx="4644390" cy="237977"/>
           </a:xfrm>
         </p:spPr>
         <p:txBody>
@@ -2804,8 +2804,8 @@
         </p:nvSpPr>
         <p:spPr>
           <a:xfrm>
-            <a:off x="1517222" y="231637"/>
-            <a:ext cx="4644390" cy="1555433"/>
+            <a:off x="1517222" y="257312"/>
+            <a:ext cx="4644390" cy="1727835"/>
           </a:xfrm>
         </p:spPr>
         <p:txBody>
@@ -2865,8 +2865,8 @@
         </p:nvSpPr>
         <p:spPr>
           <a:xfrm>
-            <a:off x="1517222" y="2028905"/>
-            <a:ext cx="4644390" cy="304245"/>
+            <a:off x="1517222" y="2253787"/>
+            <a:ext cx="4644390" cy="337967"/>
           </a:xfrm>
         </p:spPr>
         <p:txBody>
@@ -2936,7 +2936,7 @@
             <a:fld id="{1D8BD707-D9CF-40AE-B4C6-C98DA3205C09}" type="datetimeFigureOut">
               <a:rPr lang="en-US" smtClean="0"/>
               <a:pPr/>
-              <a:t>2/10/2016</a:t>
+              <a:t>3/18/2018</a:t>
             </a:fld>
             <a:endParaRPr lang="en-US"/>
           </a:p>
@@ -3027,8 +3027,8 @@
         </p:nvSpPr>
         <p:spPr>
           <a:xfrm>
-            <a:off x="387036" y="103820"/>
-            <a:ext cx="6966585" cy="432065"/>
+            <a:off x="387037" y="115328"/>
+            <a:ext cx="6966585" cy="479955"/>
           </a:xfrm>
           <a:prstGeom prst="rect">
             <a:avLst/>
@@ -3060,8 +3060,8 @@
         </p:nvSpPr>
         <p:spPr>
           <a:xfrm>
-            <a:off x="387036" y="604894"/>
-            <a:ext cx="6966585" cy="1710857"/>
+            <a:off x="387037" y="671940"/>
+            <a:ext cx="6966585" cy="1900486"/>
           </a:xfrm>
           <a:prstGeom prst="rect">
             <a:avLst/>
@@ -3122,8 +3122,8 @@
         </p:nvSpPr>
         <p:spPr>
           <a:xfrm>
-            <a:off x="387035" y="2402762"/>
-            <a:ext cx="1806152" cy="138021"/>
+            <a:off x="387035" y="2669082"/>
+            <a:ext cx="1806152" cy="153319"/>
           </a:xfrm>
           <a:prstGeom prst="rect">
             <a:avLst/>
@@ -3146,7 +3146,7 @@
             <a:fld id="{1D8BD707-D9CF-40AE-B4C6-C98DA3205C09}" type="datetimeFigureOut">
               <a:rPr lang="en-US" smtClean="0"/>
               <a:pPr/>
-              <a:t>2/10/2016</a:t>
+              <a:t>3/18/2018</a:t>
             </a:fld>
             <a:endParaRPr lang="en-US"/>
           </a:p>
@@ -3164,8 +3164,8 @@
         </p:nvSpPr>
         <p:spPr>
           <a:xfrm>
-            <a:off x="2644724" y="2402762"/>
-            <a:ext cx="2451206" cy="138021"/>
+            <a:off x="2644724" y="2669082"/>
+            <a:ext cx="2451206" cy="153319"/>
           </a:xfrm>
           <a:prstGeom prst="rect">
             <a:avLst/>
@@ -3201,8 +3201,8 @@
         </p:nvSpPr>
         <p:spPr>
           <a:xfrm>
-            <a:off x="5547469" y="2402762"/>
-            <a:ext cx="1806152" cy="138021"/>
+            <a:off x="5547469" y="2669082"/>
+            <a:ext cx="1806152" cy="153319"/>
           </a:xfrm>
           <a:prstGeom prst="rect">
             <a:avLst/>
@@ -3525,8 +3525,8 @@
         </p:nvSpPr>
         <p:spPr>
           <a:xfrm>
-            <a:off x="3979440" y="76993"/>
-            <a:ext cx="3742061" cy="1594097"/>
+            <a:off x="3979441" y="112160"/>
+            <a:ext cx="3742061" cy="1589640"/>
           </a:xfrm>
           <a:prstGeom prst="roundRect">
             <a:avLst>
@@ -3576,7 +3576,7 @@
         </p:nvSpPr>
         <p:spPr>
           <a:xfrm>
-            <a:off x="107393" y="76994"/>
+            <a:off x="107393" y="112159"/>
             <a:ext cx="3657600" cy="1594097"/>
           </a:xfrm>
           <a:prstGeom prst="roundRect">
@@ -3627,8 +3627,8 @@
         </p:nvSpPr>
         <p:spPr>
           <a:xfrm>
-            <a:off x="123207" y="2272425"/>
-            <a:ext cx="5347318" cy="293769"/>
+            <a:off x="1889125" y="2430462"/>
+            <a:ext cx="3852000" cy="347950"/>
           </a:xfrm>
           <a:prstGeom prst="roundRect">
             <a:avLst/>
@@ -3675,8 +3675,8 @@
         </p:nvSpPr>
         <p:spPr>
           <a:xfrm>
-            <a:off x="917476" y="839187"/>
-            <a:ext cx="1700606" cy="239760"/>
+            <a:off x="1866480" y="830262"/>
+            <a:ext cx="1535810" cy="239760"/>
           </a:xfrm>
           <a:prstGeom prst="roundRect">
             <a:avLst>
@@ -3710,7 +3710,7 @@
           <a:p>
             <a:pPr algn="ctr"/>
             <a:r>
-              <a:rPr lang="en-US" sz="1400" b="1" dirty="0" smtClean="0">
+              <a:rPr lang="en-US" sz="1400" b="1" dirty="0">
                 <a:solidFill>
                   <a:schemeClr val="tx1">
                     <a:lumMod val="50000"/>
@@ -3720,18 +3720,8 @@
                 <a:latin typeface="Consolas" pitchFamily="49" charset="0"/>
                 <a:cs typeface="Consolas" pitchFamily="49" charset="0"/>
               </a:rPr>
-              <a:t>Prioritized</a:t>
-            </a:r>
-            <a:endParaRPr lang="en-US" sz="1400" b="1" dirty="0" smtClean="0">
-              <a:solidFill>
-                <a:schemeClr val="tx1">
-                  <a:lumMod val="50000"/>
-                  <a:lumOff val="50000"/>
-                </a:schemeClr>
-              </a:solidFill>
-              <a:latin typeface="Consolas" pitchFamily="49" charset="0"/>
-              <a:cs typeface="Consolas" pitchFamily="49" charset="0"/>
-            </a:endParaRPr>
+              <a:t>Accepted</a:t>
+            </a:r>
           </a:p>
         </p:txBody>
       </p:sp>
@@ -3743,8 +3733,8 @@
         </p:nvSpPr>
         <p:spPr>
           <a:xfrm>
-            <a:off x="6025272" y="312864"/>
-            <a:ext cx="1426453" cy="244729"/>
+            <a:off x="6025272" y="348029"/>
+            <a:ext cx="1655054" cy="244729"/>
           </a:xfrm>
           <a:prstGeom prst="roundRect">
             <a:avLst>
@@ -3778,7 +3768,7 @@
           <a:p>
             <a:pPr algn="ctr"/>
             <a:r>
-              <a:rPr lang="en-US" sz="1400" dirty="0" err="1" smtClean="0">
+              <a:rPr lang="en-US" sz="1400" dirty="0" err="1">
                 <a:solidFill>
                   <a:schemeClr val="tx1">
                     <a:lumMod val="50000"/>
@@ -3791,7 +3781,7 @@
               <a:t>s.</a:t>
             </a:r>
             <a:r>
-              <a:rPr lang="en-US" sz="1400" b="1" dirty="0" err="1" smtClean="0">
+              <a:rPr lang="en-US" sz="1400" b="1" dirty="0" err="1">
                 <a:solidFill>
                   <a:schemeClr val="tx1">
                     <a:lumMod val="50000"/>
@@ -3801,9 +3791,9 @@
                 <a:latin typeface="Consolas" pitchFamily="49" charset="0"/>
                 <a:cs typeface="Consolas" pitchFamily="49" charset="0"/>
               </a:rPr>
-              <a:t>ToMerge</a:t>
-            </a:r>
-            <a:endParaRPr lang="en-US" sz="1400" b="1" dirty="0" smtClean="0">
+              <a:t>FinalReview</a:t>
+            </a:r>
+            <a:endParaRPr lang="en-US" sz="1400" b="1" dirty="0">
               <a:solidFill>
                 <a:schemeClr val="tx1">
                   <a:lumMod val="50000"/>
@@ -3824,7 +3814,7 @@
         </p:nvSpPr>
         <p:spPr>
           <a:xfrm>
-            <a:off x="27683" y="384955"/>
+            <a:off x="27682" y="390682"/>
             <a:ext cx="159420" cy="159420"/>
           </a:xfrm>
           <a:prstGeom prst="flowChartConnector">
@@ -3879,8 +3869,8 @@
         </p:nvCxnSpPr>
         <p:spPr>
           <a:xfrm rot="5400000">
-            <a:off x="4953105" y="151525"/>
-            <a:ext cx="571477" cy="3175186"/>
+            <a:off x="4587986" y="-144532"/>
+            <a:ext cx="631736" cy="3897890"/>
           </a:xfrm>
           <a:prstGeom prst="curvedConnector2">
             <a:avLst/>
@@ -3914,23 +3904,22 @@
         <p:nvCxnSpPr>
           <p:cNvPr id="158" name="Curved Connector 157"/>
           <p:cNvCxnSpPr>
+            <a:stCxn id="179" idx="2"/>
             <a:endCxn id="171" idx="1"/>
           </p:cNvCxnSpPr>
           <p:nvPr/>
         </p:nvCxnSpPr>
         <p:spPr>
-          <a:xfrm>
-            <a:off x="441325" y="690714"/>
-            <a:ext cx="2971800" cy="1334143"/>
-          </a:xfrm>
-          <a:prstGeom prst="curvedConnector3">
-            <a:avLst>
-              <a:gd name="adj1" fmla="val 705"/>
-            </a:avLst>
+          <a:xfrm rot="16200000" flipH="1">
+            <a:off x="1053369" y="456865"/>
+            <a:ext cx="1527523" cy="1799307"/>
+          </a:xfrm>
+          <a:prstGeom prst="curvedConnector2">
+            <a:avLst/>
           </a:prstGeom>
           <a:ln w="28575">
             <a:solidFill>
-              <a:srgbClr val="0070C0"/>
+              <a:srgbClr val="7030A0"/>
             </a:solidFill>
             <a:headEnd type="none" w="med" len="med"/>
             <a:tailEnd type="triangle" w="med" len="med"/>
@@ -3962,15 +3951,15 @@
         </p:nvCxnSpPr>
         <p:spPr>
           <a:xfrm>
-            <a:off x="1488977" y="465625"/>
-            <a:ext cx="278802" cy="373562"/>
+            <a:off x="1488977" y="470394"/>
+            <a:ext cx="1145408" cy="359868"/>
           </a:xfrm>
           <a:prstGeom prst="curvedConnector2">
             <a:avLst/>
           </a:prstGeom>
           <a:ln w="28575">
             <a:solidFill>
-              <a:srgbClr val="0070C0"/>
+              <a:srgbClr val="7030A0"/>
             </a:solidFill>
             <a:headEnd type="none" w="med" len="med"/>
             <a:tailEnd type="triangle" w="med" len="med"/>
@@ -4002,8 +3991,8 @@
         </p:nvCxnSpPr>
         <p:spPr>
           <a:xfrm>
-            <a:off x="187103" y="464665"/>
-            <a:ext cx="158874" cy="960"/>
+            <a:off x="187103" y="470393"/>
+            <a:ext cx="158875" cy="1"/>
           </a:xfrm>
           <a:prstGeom prst="straightConnector1">
             <a:avLst/>
@@ -4035,14 +4024,14 @@
       </p:cxnSp>
       <p:sp>
         <p:nvSpPr>
-          <p:cNvPr id="177" name="Rounded Rectangle 176"/>
+          <p:cNvPr id="178" name="Rounded Rectangle 177"/>
           <p:cNvSpPr/>
           <p:nvPr/>
         </p:nvSpPr>
         <p:spPr>
           <a:xfrm>
-            <a:off x="1913979" y="1219994"/>
-            <a:ext cx="1676400" cy="249589"/>
+            <a:off x="4233482" y="348229"/>
+            <a:ext cx="1417517" cy="244529"/>
           </a:xfrm>
           <a:prstGeom prst="roundRect">
             <a:avLst>
@@ -4076,7 +4065,7 @@
           <a:p>
             <a:pPr algn="ctr"/>
             <a:r>
-              <a:rPr lang="en-US" sz="1400" b="1" smtClean="0">
+              <a:rPr lang="en-US" sz="1400" dirty="0" err="1">
                 <a:solidFill>
                   <a:schemeClr val="tx1">
                     <a:lumMod val="50000"/>
@@ -4086,9 +4075,22 @@
                 <a:latin typeface="Consolas" pitchFamily="49" charset="0"/>
                 <a:cs typeface="Consolas" pitchFamily="49" charset="0"/>
               </a:rPr>
-              <a:t>Assigned</a:t>
-            </a:r>
-            <a:endParaRPr lang="en-US" sz="1400" b="1" dirty="0" smtClean="0">
+              <a:t>s.</a:t>
+            </a:r>
+            <a:r>
+              <a:rPr lang="en-US" sz="1400" b="1" dirty="0" err="1">
+                <a:solidFill>
+                  <a:schemeClr val="tx1">
+                    <a:lumMod val="50000"/>
+                    <a:lumOff val="50000"/>
+                  </a:schemeClr>
+                </a:solidFill>
+                <a:latin typeface="Consolas" pitchFamily="49" charset="0"/>
+                <a:cs typeface="Consolas" pitchFamily="49" charset="0"/>
+              </a:rPr>
+              <a:t>ToReview</a:t>
+            </a:r>
+            <a:endParaRPr lang="en-US" sz="1400" b="1" dirty="0">
               <a:solidFill>
                 <a:schemeClr val="tx1">
                   <a:lumMod val="50000"/>
@@ -4103,14 +4105,14 @@
       </p:sp>
       <p:sp>
         <p:nvSpPr>
-          <p:cNvPr id="178" name="Rounded Rectangle 177"/>
+          <p:cNvPr id="179" name="Rounded Rectangle 178"/>
           <p:cNvSpPr/>
           <p:nvPr/>
         </p:nvSpPr>
         <p:spPr>
           <a:xfrm>
-            <a:off x="4233481" y="313064"/>
-            <a:ext cx="1417517" cy="244529"/>
+            <a:off x="345977" y="348029"/>
+            <a:ext cx="1143000" cy="244729"/>
           </a:xfrm>
           <a:prstGeom prst="roundRect">
             <a:avLst>
@@ -4139,12 +4141,12 @@
           </a:fontRef>
         </p:style>
         <p:txBody>
-          <a:bodyPr vert="horz" rtlCol="0" anchor="ctr" anchorCtr="0"/>
+          <a:bodyPr vert="horz" lIns="0" rIns="0" rtlCol="0" anchor="ctr" anchorCtr="0"/>
           <a:lstStyle/>
           <a:p>
             <a:pPr algn="ctr"/>
             <a:r>
-              <a:rPr lang="en-US" sz="1400" dirty="0" err="1" smtClean="0">
+              <a:rPr lang="en-US" sz="1400" b="1" dirty="0">
                 <a:solidFill>
                   <a:schemeClr val="tx1">
                     <a:lumMod val="50000"/>
@@ -4154,22 +4156,9 @@
                 <a:latin typeface="Consolas" pitchFamily="49" charset="0"/>
                 <a:cs typeface="Consolas" pitchFamily="49" charset="0"/>
               </a:rPr>
-              <a:t>s.</a:t>
-            </a:r>
-            <a:r>
-              <a:rPr lang="en-US" sz="1400" b="1" dirty="0" err="1" smtClean="0">
-                <a:solidFill>
-                  <a:schemeClr val="tx1">
-                    <a:lumMod val="50000"/>
-                    <a:lumOff val="50000"/>
-                  </a:schemeClr>
-                </a:solidFill>
-                <a:latin typeface="Consolas" pitchFamily="49" charset="0"/>
-                <a:cs typeface="Consolas" pitchFamily="49" charset="0"/>
-              </a:rPr>
-              <a:t>ToReview</a:t>
-            </a:r>
-            <a:endParaRPr lang="en-US" sz="1400" b="1" dirty="0">
+              <a:t>New</a:t>
+            </a:r>
+            <a:endParaRPr lang="en-US" sz="1400" dirty="0">
               <a:solidFill>
                 <a:schemeClr val="tx1">
                   <a:lumMod val="50000"/>
@@ -4184,96 +4173,13 @@
       </p:sp>
       <p:sp>
         <p:nvSpPr>
-          <p:cNvPr id="179" name="Rounded Rectangle 178"/>
-          <p:cNvSpPr/>
-          <p:nvPr/>
-        </p:nvSpPr>
-        <p:spPr>
-          <a:xfrm>
-            <a:off x="345977" y="240535"/>
-            <a:ext cx="1143000" cy="450179"/>
-          </a:xfrm>
-          <a:prstGeom prst="roundRect">
-            <a:avLst>
-              <a:gd name="adj" fmla="val 9190"/>
-            </a:avLst>
-          </a:prstGeom>
-          <a:solidFill>
-            <a:schemeClr val="bg1"/>
-          </a:solidFill>
-          <a:ln>
-            <a:noFill/>
-          </a:ln>
-        </p:spPr>
-        <p:style>
-          <a:lnRef idx="2">
-            <a:schemeClr val="accent2"/>
-          </a:lnRef>
-          <a:fillRef idx="1">
-            <a:schemeClr val="lt1"/>
-          </a:fillRef>
-          <a:effectRef idx="0">
-            <a:schemeClr val="accent2"/>
-          </a:effectRef>
-          <a:fontRef idx="minor">
-            <a:schemeClr val="dk1"/>
-          </a:fontRef>
-        </p:style>
-        <p:txBody>
-          <a:bodyPr vert="horz" lIns="0" rIns="0" rtlCol="0" anchor="ctr" anchorCtr="0"/>
-          <a:lstStyle/>
-          <a:p>
-            <a:pPr algn="ctr"/>
-            <a:r>
-              <a:rPr lang="en-US" sz="1400" b="1" dirty="0" smtClean="0">
-                <a:solidFill>
-                  <a:schemeClr val="tx1">
-                    <a:lumMod val="50000"/>
-                    <a:lumOff val="50000"/>
-                  </a:schemeClr>
-                </a:solidFill>
-                <a:latin typeface="Consolas" pitchFamily="49" charset="0"/>
-                <a:cs typeface="Consolas" pitchFamily="49" charset="0"/>
-              </a:rPr>
-              <a:t>New </a:t>
-            </a:r>
-            <a:br>
-              <a:rPr lang="en-US" sz="1400" b="1" dirty="0" smtClean="0">
-                <a:solidFill>
-                  <a:schemeClr val="tx1">
-                    <a:lumMod val="50000"/>
-                    <a:lumOff val="50000"/>
-                  </a:schemeClr>
-                </a:solidFill>
-                <a:latin typeface="Consolas" pitchFamily="49" charset="0"/>
-                <a:cs typeface="Consolas" pitchFamily="49" charset="0"/>
-              </a:rPr>
-            </a:br>
-            <a:r>
-              <a:rPr lang="en-US" sz="1400" dirty="0" smtClean="0">
-                <a:solidFill>
-                  <a:schemeClr val="tx1">
-                    <a:lumMod val="50000"/>
-                    <a:lumOff val="50000"/>
-                  </a:schemeClr>
-                </a:solidFill>
-                <a:latin typeface="Consolas" pitchFamily="49" charset="0"/>
-                <a:cs typeface="Consolas" pitchFamily="49" charset="0"/>
-              </a:rPr>
-              <a:t>[no status]</a:t>
-            </a:r>
-          </a:p>
-        </p:txBody>
-      </p:sp>
-      <p:sp>
-        <p:nvSpPr>
           <p:cNvPr id="192" name="TextBox 191"/>
           <p:cNvSpPr txBox="1"/>
           <p:nvPr/>
         </p:nvSpPr>
         <p:spPr>
           <a:xfrm>
-            <a:off x="123207" y="2226972"/>
+            <a:off x="1914748" y="2441205"/>
             <a:ext cx="533400" cy="323165"/>
           </a:xfrm>
           <a:prstGeom prst="rect">
@@ -4289,7 +4195,7 @@
           <a:p>
             <a:pPr algn="r"/>
             <a:r>
-              <a:rPr lang="en-US" b="1" dirty="0" err="1" smtClean="0">
+              <a:rPr lang="en-US" b="1" dirty="0" err="1">
                 <a:solidFill>
                   <a:srgbClr val="00B050"/>
                 </a:solidFill>
@@ -4312,7 +4218,7 @@
         </p:nvSpPr>
         <p:spPr>
           <a:xfrm>
-            <a:off x="1009590" y="2236377"/>
+            <a:off x="2728478" y="2438564"/>
             <a:ext cx="958774" cy="323165"/>
           </a:xfrm>
           <a:prstGeom prst="rect">
@@ -4328,7 +4234,7 @@
           <a:p>
             <a:pPr algn="r"/>
             <a:r>
-              <a:rPr lang="en-US" b="1" dirty="0" smtClean="0">
+              <a:rPr lang="en-US" b="1" dirty="0">
                 <a:solidFill>
                   <a:schemeClr val="accent6">
                     <a:lumMod val="75000"/>
@@ -4347,101 +4253,23 @@
           </a:p>
         </p:txBody>
       </p:sp>
-      <p:sp>
-        <p:nvSpPr>
-          <p:cNvPr id="194" name="TextBox 193"/>
-          <p:cNvSpPr txBox="1"/>
-          <p:nvPr/>
-        </p:nvSpPr>
-        <p:spPr>
-          <a:xfrm>
-            <a:off x="3622416" y="2255529"/>
-            <a:ext cx="1447800" cy="323165"/>
-          </a:xfrm>
-          <a:prstGeom prst="rect">
-            <a:avLst/>
-          </a:prstGeom>
-          <a:noFill/>
-        </p:spPr>
-        <p:txBody>
-          <a:bodyPr wrap="square" rtlCol="0">
-            <a:spAutoFit/>
-          </a:bodyPr>
-          <a:lstStyle/>
-          <a:p>
-            <a:pPr algn="r"/>
-            <a:r>
-              <a:rPr lang="en-US" b="1" dirty="0" smtClean="0">
-                <a:solidFill>
-                  <a:srgbClr val="0070C0"/>
-                </a:solidFill>
-              </a:rPr>
-              <a:t>Project Mentor</a:t>
-            </a:r>
-            <a:endParaRPr lang="en-SG" b="1" dirty="0">
-              <a:solidFill>
-                <a:srgbClr val="0070C0"/>
-              </a:solidFill>
-            </a:endParaRPr>
-          </a:p>
-        </p:txBody>
-      </p:sp>
-      <p:cxnSp>
-        <p:nvCxnSpPr>
-          <p:cNvPr id="61" name="Curved Connector 60"/>
-          <p:cNvCxnSpPr>
-            <a:stCxn id="135" idx="3"/>
-            <a:endCxn id="177" idx="0"/>
-          </p:cNvCxnSpPr>
-          <p:nvPr/>
-        </p:nvCxnSpPr>
-        <p:spPr>
-          <a:xfrm>
-            <a:off x="2618082" y="959067"/>
-            <a:ext cx="134097" cy="260927"/>
-          </a:xfrm>
-          <a:prstGeom prst="curvedConnector2">
-            <a:avLst/>
-          </a:prstGeom>
-          <a:ln w="28575">
-            <a:solidFill>
-              <a:srgbClr val="00B050"/>
-            </a:solidFill>
-            <a:headEnd type="none" w="med" len="med"/>
-            <a:tailEnd type="triangle" w="med" len="med"/>
-          </a:ln>
-        </p:spPr>
-        <p:style>
-          <a:lnRef idx="1">
-            <a:schemeClr val="accent1"/>
-          </a:lnRef>
-          <a:fillRef idx="0">
-            <a:schemeClr val="accent1"/>
-          </a:fillRef>
-          <a:effectRef idx="0">
-            <a:schemeClr val="accent1"/>
-          </a:effectRef>
-          <a:fontRef idx="minor">
-            <a:schemeClr val="tx1"/>
-          </a:fontRef>
-        </p:style>
-      </p:cxnSp>
       <p:cxnSp>
         <p:nvCxnSpPr>
           <p:cNvPr id="64" name="Curved Connector 63"/>
           <p:cNvCxnSpPr>
+            <a:stCxn id="135" idx="2"/>
             <a:endCxn id="171" idx="0"/>
           </p:cNvCxnSpPr>
           <p:nvPr/>
         </p:nvCxnSpPr>
         <p:spPr>
           <a:xfrm rot="16200000" flipH="1">
-            <a:off x="3158162" y="1531767"/>
-            <a:ext cx="426503" cy="321550"/>
+            <a:off x="2269518" y="1434889"/>
+            <a:ext cx="931196" cy="201462"/>
           </a:xfrm>
           <a:prstGeom prst="curvedConnector3">
             <a:avLst>
-              <a:gd name="adj1" fmla="val 63102"/>
+              <a:gd name="adj1" fmla="val 50000"/>
             </a:avLst>
           </a:prstGeom>
           <a:ln w="28575">
@@ -4477,7 +4305,7 @@
         </p:nvSpPr>
         <p:spPr>
           <a:xfrm>
-            <a:off x="3927377" y="384955"/>
+            <a:off x="3911933" y="1286194"/>
             <a:ext cx="159420" cy="159420"/>
           </a:xfrm>
           <a:prstGeom prst="flowChartConnector">
@@ -4526,13 +4354,14 @@
           <p:cNvPr id="115" name="Straight Arrow Connector 114"/>
           <p:cNvCxnSpPr>
             <a:stCxn id="114" idx="6"/>
+            <a:endCxn id="120" idx="1"/>
           </p:cNvCxnSpPr>
           <p:nvPr/>
         </p:nvCxnSpPr>
         <p:spPr>
-          <a:xfrm>
-            <a:off x="4086797" y="464665"/>
-            <a:ext cx="158874" cy="960"/>
+          <a:xfrm flipV="1">
+            <a:off x="4071353" y="1362546"/>
+            <a:ext cx="162128" cy="3359"/>
           </a:xfrm>
           <a:prstGeom prst="straightConnector1">
             <a:avLst/>
@@ -4570,7 +4399,7 @@
         </p:nvSpPr>
         <p:spPr>
           <a:xfrm>
-            <a:off x="4233481" y="1201381"/>
+            <a:off x="4233482" y="1236545"/>
             <a:ext cx="1417517" cy="252000"/>
           </a:xfrm>
           <a:prstGeom prst="roundRect">
@@ -4605,7 +4434,7 @@
           <a:p>
             <a:pPr algn="ctr"/>
             <a:r>
-              <a:rPr lang="en-US" sz="1400" dirty="0" err="1" smtClean="0">
+              <a:rPr lang="en-US" sz="1400" dirty="0" err="1">
                 <a:solidFill>
                   <a:schemeClr val="tx1">
                     <a:lumMod val="50000"/>
@@ -4618,7 +4447,7 @@
               <a:t>s.</a:t>
             </a:r>
             <a:r>
-              <a:rPr lang="en-US" sz="1400" b="1" dirty="0" err="1" smtClean="0">
+              <a:rPr lang="en-US" sz="1400" b="1" dirty="0" err="1">
                 <a:solidFill>
                   <a:schemeClr val="tx1">
                     <a:lumMod val="50000"/>
@@ -4630,7 +4459,7 @@
               </a:rPr>
               <a:t>Ongoing</a:t>
             </a:r>
-            <a:endParaRPr lang="en-US" sz="1400" b="1" dirty="0" smtClean="0">
+            <a:endParaRPr lang="en-US" sz="1400" b="1" dirty="0">
               <a:solidFill>
                 <a:schemeClr val="tx1">
                   <a:lumMod val="50000"/>
@@ -4647,17 +4476,20 @@
         <p:nvCxnSpPr>
           <p:cNvPr id="125" name="Curved Connector 124"/>
           <p:cNvCxnSpPr>
+            <a:stCxn id="135" idx="3"/>
             <a:endCxn id="114" idx="2"/>
           </p:cNvCxnSpPr>
           <p:nvPr/>
         </p:nvCxnSpPr>
         <p:spPr>
-          <a:xfrm rot="5400000" flipH="1" flipV="1">
-            <a:off x="3353097" y="645714"/>
-            <a:ext cx="755329" cy="393232"/>
-          </a:xfrm>
-          <a:prstGeom prst="curvedConnector2">
-            <a:avLst/>
+          <a:xfrm>
+            <a:off x="3402290" y="950142"/>
+            <a:ext cx="509643" cy="415762"/>
+          </a:xfrm>
+          <a:prstGeom prst="curvedConnector3">
+            <a:avLst>
+              <a:gd name="adj1" fmla="val 50000"/>
+            </a:avLst>
           </a:prstGeom>
           <a:ln w="28575">
             <a:solidFill>
@@ -4694,7 +4526,7 @@
         </p:nvCxnSpPr>
         <p:spPr>
           <a:xfrm flipV="1">
-            <a:off x="5650998" y="435229"/>
+            <a:off x="5650998" y="470393"/>
             <a:ext cx="374274" cy="100"/>
           </a:xfrm>
           <a:prstGeom prst="curvedConnector3">
@@ -4735,8 +4567,8 @@
         </p:nvSpPr>
         <p:spPr>
           <a:xfrm>
-            <a:off x="3557745" y="2024856"/>
-            <a:ext cx="1775707" cy="301136"/>
+            <a:off x="2919973" y="2129326"/>
+            <a:ext cx="924156" cy="301136"/>
           </a:xfrm>
           <a:prstGeom prst="roundRect">
             <a:avLst>
@@ -4766,7 +4598,6 @@
           <a:bodyPr vert="horz" lIns="0" rIns="0" rtlCol="0" anchor="ctr" anchorCtr="0"/>
           <a:lstStyle/>
           <a:p>
-            <a:pPr algn="ctr"/>
             <a:r>
               <a:rPr lang="en-US" sz="1400" b="1" dirty="0" smtClean="0">
                 <a:solidFill>
@@ -4780,32 +4611,32 @@
               </a:rPr>
               <a:t>Closed</a:t>
             </a:r>
-            <a:r>
-              <a:rPr lang="en-US" sz="1400" dirty="0" smtClean="0">
-                <a:solidFill>
-                  <a:schemeClr val="tx1">
-                    <a:lumMod val="50000"/>
-                    <a:lumOff val="50000"/>
-                  </a:schemeClr>
-                </a:solidFill>
-                <a:latin typeface="Consolas" pitchFamily="49" charset="0"/>
-                <a:cs typeface="Consolas" pitchFamily="49" charset="0"/>
-              </a:rPr>
-              <a:t>[no status]</a:t>
-            </a:r>
+            <a:endParaRPr lang="en-US" sz="1400" dirty="0">
+              <a:solidFill>
+                <a:schemeClr val="tx1">
+                  <a:lumMod val="50000"/>
+                  <a:lumOff val="50000"/>
+                </a:schemeClr>
+              </a:solidFill>
+              <a:latin typeface="Consolas" pitchFamily="49" charset="0"/>
+              <a:cs typeface="Consolas" pitchFamily="49" charset="0"/>
+            </a:endParaRPr>
           </a:p>
         </p:txBody>
       </p:sp>
       <p:cxnSp>
         <p:nvCxnSpPr>
           <p:cNvPr id="113" name="Straight Arrow Connector 112"/>
-          <p:cNvCxnSpPr/>
+          <p:cNvCxnSpPr>
+            <a:stCxn id="192" idx="3"/>
+            <a:endCxn id="193" idx="1"/>
+          </p:cNvCxnSpPr>
           <p:nvPr/>
         </p:nvCxnSpPr>
         <p:spPr>
-          <a:xfrm>
-            <a:off x="594360" y="2397960"/>
-            <a:ext cx="342756" cy="0"/>
+          <a:xfrm flipV="1">
+            <a:off x="2448148" y="2600147"/>
+            <a:ext cx="280330" cy="2641"/>
           </a:xfrm>
           <a:prstGeom prst="straightConnector1">
             <a:avLst/>
@@ -4836,13 +4667,16 @@
       <p:cxnSp>
         <p:nvCxnSpPr>
           <p:cNvPr id="164" name="Straight Arrow Connector 163"/>
-          <p:cNvCxnSpPr/>
+          <p:cNvCxnSpPr>
+            <a:stCxn id="193" idx="3"/>
+            <a:endCxn id="48" idx="1"/>
+          </p:cNvCxnSpPr>
           <p:nvPr/>
         </p:nvCxnSpPr>
         <p:spPr>
           <a:xfrm>
-            <a:off x="1906117" y="2417951"/>
-            <a:ext cx="342756" cy="0"/>
+            <a:off x="3687252" y="2600147"/>
+            <a:ext cx="280331" cy="2641"/>
           </a:xfrm>
           <a:prstGeom prst="straightConnector1">
             <a:avLst/>
@@ -4872,43 +4706,6 @@
           </a:fontRef>
         </p:style>
       </p:cxnSp>
-      <p:cxnSp>
-        <p:nvCxnSpPr>
-          <p:cNvPr id="165" name="Straight Arrow Connector 164"/>
-          <p:cNvCxnSpPr/>
-          <p:nvPr/>
-        </p:nvCxnSpPr>
-        <p:spPr>
-          <a:xfrm>
-            <a:off x="5051569" y="2428337"/>
-            <a:ext cx="342756" cy="0"/>
-          </a:xfrm>
-          <a:prstGeom prst="straightConnector1">
-            <a:avLst/>
-          </a:prstGeom>
-          <a:ln w="28575">
-            <a:solidFill>
-              <a:srgbClr val="0070C0"/>
-            </a:solidFill>
-            <a:headEnd type="none" w="med" len="med"/>
-            <a:tailEnd type="triangle" w="med" len="med"/>
-          </a:ln>
-        </p:spPr>
-        <p:style>
-          <a:lnRef idx="1">
-            <a:schemeClr val="accent1"/>
-          </a:lnRef>
-          <a:fillRef idx="0">
-            <a:schemeClr val="accent1"/>
-          </a:fillRef>
-          <a:effectRef idx="0">
-            <a:schemeClr val="accent1"/>
-          </a:effectRef>
-          <a:fontRef idx="minor">
-            <a:schemeClr val="tx1"/>
-          </a:fontRef>
-        </p:style>
-      </p:cxnSp>
       <p:sp>
         <p:nvSpPr>
           <p:cNvPr id="116" name="TextBox 115"/>
@@ -4916,8 +4713,8 @@
           <p:nvPr/>
         </p:nvSpPr>
         <p:spPr>
-          <a:xfrm rot="1653643">
-            <a:off x="335344" y="1572952"/>
+          <a:xfrm rot="3050600">
+            <a:off x="698320" y="1261688"/>
             <a:ext cx="685800" cy="323165"/>
           </a:xfrm>
           <a:prstGeom prst="rect">
@@ -4932,7 +4729,7 @@
           <a:lstStyle/>
           <a:p>
             <a:r>
-              <a:rPr lang="en-US" dirty="0" smtClean="0">
+              <a:rPr lang="en-US" dirty="0">
                 <a:solidFill>
                   <a:schemeClr val="bg1">
                     <a:lumMod val="50000"/>
@@ -4981,7 +4778,7 @@
         </p:blipFill>
         <p:spPr bwMode="auto">
           <a:xfrm>
-            <a:off x="3413125" y="1905794"/>
+            <a:off x="2716784" y="2001218"/>
             <a:ext cx="238125" cy="238125"/>
           </a:xfrm>
           <a:prstGeom prst="rect">
@@ -5025,12 +4822,14 @@
       <p:cxnSp>
         <p:nvCxnSpPr>
           <p:cNvPr id="1030" name="Straight Arrow Connector 1029"/>
-          <p:cNvCxnSpPr/>
+          <p:cNvCxnSpPr>
+            <a:stCxn id="120" idx="0"/>
+          </p:cNvCxnSpPr>
           <p:nvPr/>
         </p:nvCxnSpPr>
         <p:spPr>
           <a:xfrm flipV="1">
-            <a:off x="5013325" y="557593"/>
+            <a:off x="4942240" y="592757"/>
             <a:ext cx="0" cy="643789"/>
           </a:xfrm>
           <a:prstGeom prst="straightConnector1">
@@ -5067,7 +4866,7 @@
         </p:nvSpPr>
         <p:spPr>
           <a:xfrm>
-            <a:off x="1936193" y="96142"/>
+            <a:off x="2749540" y="131307"/>
             <a:ext cx="815985" cy="323165"/>
           </a:xfrm>
           <a:prstGeom prst="rect">
@@ -5082,7 +4881,7 @@
           <a:lstStyle/>
           <a:p>
             <a:r>
-              <a:rPr lang="en-US" b="1" dirty="0" smtClean="0">
+              <a:rPr lang="en-US" b="1" dirty="0">
                 <a:solidFill>
                   <a:schemeClr val="bg1"/>
                 </a:solidFill>
@@ -5105,7 +4904,7 @@
         </p:nvSpPr>
         <p:spPr>
           <a:xfrm>
-            <a:off x="6905433" y="61412"/>
+            <a:off x="6905434" y="96577"/>
             <a:ext cx="525337" cy="323165"/>
           </a:xfrm>
           <a:prstGeom prst="rect">
@@ -5120,7 +4919,7 @@
           <a:lstStyle/>
           <a:p>
             <a:r>
-              <a:rPr lang="en-US" b="1" dirty="0" smtClean="0">
+              <a:rPr lang="en-US" b="1" dirty="0">
                 <a:solidFill>
                   <a:schemeClr val="bg1"/>
                 </a:solidFill>
@@ -5135,46 +4934,6 @@
           </a:p>
         </p:txBody>
       </p:sp>
-      <p:cxnSp>
-        <p:nvCxnSpPr>
-          <p:cNvPr id="35" name="Curved Connector 34"/>
-          <p:cNvCxnSpPr>
-            <a:stCxn id="177" idx="1"/>
-            <a:endCxn id="135" idx="2"/>
-          </p:cNvCxnSpPr>
-          <p:nvPr/>
-        </p:nvCxnSpPr>
-        <p:spPr>
-          <a:xfrm rot="10800000">
-            <a:off x="1767779" y="1078947"/>
-            <a:ext cx="146200" cy="265842"/>
-          </a:xfrm>
-          <a:prstGeom prst="curvedConnector2">
-            <a:avLst/>
-          </a:prstGeom>
-          <a:ln w="28575">
-            <a:solidFill>
-              <a:srgbClr val="7030A0"/>
-            </a:solidFill>
-            <a:headEnd type="none" w="med" len="med"/>
-            <a:tailEnd type="triangle" w="med" len="med"/>
-          </a:ln>
-        </p:spPr>
-        <p:style>
-          <a:lnRef idx="1">
-            <a:schemeClr val="accent1"/>
-          </a:lnRef>
-          <a:fillRef idx="0">
-            <a:schemeClr val="accent1"/>
-          </a:fillRef>
-          <a:effectRef idx="0">
-            <a:schemeClr val="accent1"/>
-          </a:effectRef>
-          <a:fontRef idx="minor">
-            <a:schemeClr val="tx1"/>
-          </a:fontRef>
-        </p:style>
-      </p:cxnSp>
       <p:cxnSp>
         <p:nvCxnSpPr>
           <p:cNvPr id="37" name="Straight Arrow Connector 36"/>
@@ -5183,7 +4942,7 @@
         </p:nvCxnSpPr>
         <p:spPr>
           <a:xfrm>
-            <a:off x="4784725" y="557593"/>
+            <a:off x="4784725" y="592757"/>
             <a:ext cx="0" cy="643788"/>
           </a:xfrm>
           <a:prstGeom prst="straightConnector1">
@@ -5222,8 +4981,8 @@
         </p:nvSpPr>
         <p:spPr>
           <a:xfrm>
-            <a:off x="5972546" y="1201381"/>
-            <a:ext cx="1707780" cy="251999"/>
+            <a:off x="6025272" y="1236546"/>
+            <a:ext cx="1655054" cy="251999"/>
           </a:xfrm>
           <a:prstGeom prst="roundRect">
             <a:avLst>
@@ -5257,7 +5016,7 @@
           <a:p>
             <a:pPr algn="ctr"/>
             <a:r>
-              <a:rPr lang="en-US" sz="1400" dirty="0" err="1" smtClean="0">
+              <a:rPr lang="en-US" sz="1400" dirty="0" err="1">
                 <a:solidFill>
                   <a:schemeClr val="tx1">
                     <a:lumMod val="50000"/>
@@ -5267,10 +5026,10 @@
                 <a:latin typeface="Consolas" pitchFamily="49" charset="0"/>
                 <a:cs typeface="Consolas" pitchFamily="49" charset="0"/>
               </a:rPr>
-              <a:t>s.m</a:t>
-            </a:r>
-            <a:r>
-              <a:rPr lang="en-US" sz="1400" b="1" dirty="0" err="1" smtClean="0">
+              <a:t>s.</a:t>
+            </a:r>
+            <a:r>
+              <a:rPr lang="en-US" sz="1400" b="1" dirty="0" err="1">
                 <a:solidFill>
                   <a:schemeClr val="tx1">
                     <a:lumMod val="50000"/>
@@ -5280,9 +5039,9 @@
                 <a:latin typeface="Consolas" pitchFamily="49" charset="0"/>
                 <a:cs typeface="Consolas" pitchFamily="49" charset="0"/>
               </a:rPr>
-              <a:t>ergeApproved</a:t>
-            </a:r>
-            <a:endParaRPr lang="en-US" sz="1400" b="1" dirty="0" smtClean="0">
+              <a:t>ToMerge</a:t>
+            </a:r>
+            <a:endParaRPr lang="en-US" sz="1400" b="1" dirty="0">
               <a:solidFill>
                 <a:schemeClr val="tx1">
                   <a:lumMod val="50000"/>
@@ -5303,7 +5062,7 @@
         </p:nvCxnSpPr>
         <p:spPr>
           <a:xfrm flipV="1">
-            <a:off x="5650998" y="596604"/>
+            <a:off x="5627937" y="602291"/>
             <a:ext cx="580224" cy="626856"/>
           </a:xfrm>
           <a:prstGeom prst="straightConnector1">
@@ -5340,7 +5099,7 @@
         </p:nvCxnSpPr>
         <p:spPr>
           <a:xfrm flipH="1">
-            <a:off x="5394325" y="544375"/>
+            <a:off x="5398649" y="579539"/>
             <a:ext cx="608066" cy="657006"/>
           </a:xfrm>
           <a:prstGeom prst="straightConnector1">
@@ -5348,7 +5107,7 @@
           </a:prstGeom>
           <a:ln w="28575">
             <a:solidFill>
-              <a:srgbClr val="0070C0"/>
+              <a:srgbClr val="7030A0"/>
             </a:solidFill>
             <a:headEnd type="none" w="med" len="med"/>
             <a:tailEnd type="triangle" w="med" len="med"/>
@@ -5372,12 +5131,15 @@
       <p:cxnSp>
         <p:nvCxnSpPr>
           <p:cNvPr id="83" name="Straight Arrow Connector 82"/>
-          <p:cNvCxnSpPr/>
+          <p:cNvCxnSpPr>
+            <a:stCxn id="139" idx="2"/>
+            <a:endCxn id="57" idx="0"/>
+          </p:cNvCxnSpPr>
           <p:nvPr/>
         </p:nvCxnSpPr>
         <p:spPr>
           <a:xfrm>
-            <a:off x="6826436" y="557593"/>
+            <a:off x="6852799" y="592757"/>
             <a:ext cx="0" cy="643788"/>
           </a:xfrm>
           <a:prstGeom prst="straightConnector1">
@@ -5385,7 +5147,7 @@
           </a:prstGeom>
           <a:ln w="28575">
             <a:solidFill>
-              <a:srgbClr val="0070C0"/>
+              <a:srgbClr val="7030A0"/>
             </a:solidFill>
             <a:headEnd type="none" w="med" len="med"/>
             <a:tailEnd type="triangle" w="med" len="med"/>
@@ -5417,12 +5179,12 @@
         </p:nvCxnSpPr>
         <p:spPr>
           <a:xfrm rot="5400000">
-            <a:off x="4011008" y="974561"/>
-            <a:ext cx="452413" cy="1410052"/>
+            <a:off x="3632708" y="691684"/>
+            <a:ext cx="512673" cy="2106394"/>
           </a:xfrm>
           <a:prstGeom prst="curvedConnector3">
             <a:avLst>
-              <a:gd name="adj1" fmla="val 81441"/>
+              <a:gd name="adj1" fmla="val 50000"/>
             </a:avLst>
           </a:prstGeom>
           <a:ln w="28575">
@@ -5448,108 +5210,18 @@
           </a:fontRef>
         </p:style>
       </p:cxnSp>
-      <p:sp>
-        <p:nvSpPr>
-          <p:cNvPr id="92" name="TextBox 91"/>
-          <p:cNvSpPr txBox="1"/>
-          <p:nvPr/>
-        </p:nvSpPr>
-        <p:spPr>
-          <a:xfrm>
-            <a:off x="3595179" y="1595228"/>
-            <a:ext cx="1057275" cy="230832"/>
-          </a:xfrm>
-          <a:prstGeom prst="rect">
-            <a:avLst/>
-          </a:prstGeom>
-          <a:noFill/>
-        </p:spPr>
-        <p:txBody>
-          <a:bodyPr wrap="square" rtlCol="0">
-            <a:spAutoFit/>
-          </a:bodyPr>
-          <a:lstStyle/>
-          <a:p>
-            <a:pPr algn="r"/>
-            <a:r>
-              <a:rPr lang="en-US" sz="900" dirty="0" smtClean="0">
-                <a:solidFill>
-                  <a:schemeClr val="bg1">
-                    <a:lumMod val="50000"/>
-                  </a:schemeClr>
-                </a:solidFill>
-              </a:rPr>
-              <a:t>Abandoned by </a:t>
-            </a:r>
-            <a:r>
-              <a:rPr lang="en-US" sz="900" dirty="0" err="1" smtClean="0">
-                <a:solidFill>
-                  <a:schemeClr val="bg1">
-                    <a:lumMod val="50000"/>
-                  </a:schemeClr>
-                </a:solidFill>
-              </a:rPr>
-              <a:t>dev</a:t>
-            </a:r>
-            <a:endParaRPr lang="en-SG" sz="900" dirty="0">
-              <a:solidFill>
-                <a:schemeClr val="bg1">
-                  <a:lumMod val="50000"/>
-                </a:schemeClr>
-              </a:solidFill>
-            </a:endParaRPr>
-          </a:p>
-        </p:txBody>
-      </p:sp>
-      <p:sp>
-        <p:nvSpPr>
-          <p:cNvPr id="99" name="TextBox 98"/>
-          <p:cNvSpPr txBox="1"/>
-          <p:nvPr/>
-        </p:nvSpPr>
-        <p:spPr>
-          <a:xfrm>
-            <a:off x="2259718" y="2246043"/>
-            <a:ext cx="984919" cy="323165"/>
-          </a:xfrm>
-          <a:prstGeom prst="rect">
-            <a:avLst/>
-          </a:prstGeom>
-          <a:noFill/>
-        </p:spPr>
-        <p:txBody>
-          <a:bodyPr wrap="square" rtlCol="0">
-            <a:spAutoFit/>
-          </a:bodyPr>
-          <a:lstStyle/>
-          <a:p>
-            <a:pPr algn="r"/>
-            <a:r>
-              <a:rPr lang="en-US" b="1" dirty="0" smtClean="0">
-                <a:solidFill>
-                  <a:srgbClr val="7030A0"/>
-                </a:solidFill>
-              </a:rPr>
-              <a:t>Area Lead</a:t>
-            </a:r>
-            <a:endParaRPr lang="en-SG" b="1" dirty="0">
-              <a:solidFill>
-                <a:srgbClr val="7030A0"/>
-              </a:solidFill>
-            </a:endParaRPr>
-          </a:p>
-        </p:txBody>
-      </p:sp>
       <p:cxnSp>
         <p:nvCxnSpPr>
           <p:cNvPr id="100" name="Straight Arrow Connector 99"/>
-          <p:cNvCxnSpPr/>
+          <p:cNvCxnSpPr>
+            <a:stCxn id="48" idx="3"/>
+          </p:cNvCxnSpPr>
           <p:nvPr/>
         </p:nvCxnSpPr>
         <p:spPr>
-          <a:xfrm>
-            <a:off x="3241747" y="2417951"/>
-            <a:ext cx="342756" cy="0"/>
+          <a:xfrm flipV="1">
+            <a:off x="5303044" y="2600147"/>
+            <a:ext cx="282723" cy="2641"/>
           </a:xfrm>
           <a:prstGeom prst="straightConnector1">
             <a:avLst/>
@@ -5579,14 +5251,14 @@
       </p:cxnSp>
       <p:sp>
         <p:nvSpPr>
-          <p:cNvPr id="105" name="TextBox 104"/>
+          <p:cNvPr id="48" name="TextBox 47"/>
           <p:cNvSpPr txBox="1"/>
           <p:nvPr/>
         </p:nvSpPr>
         <p:spPr>
           <a:xfrm>
-            <a:off x="776448" y="1142324"/>
-            <a:ext cx="1057275" cy="230832"/>
+            <a:off x="3967583" y="2441205"/>
+            <a:ext cx="1335461" cy="323165"/>
           </a:xfrm>
           <a:prstGeom prst="rect">
             <a:avLst/>
@@ -5601,26 +5273,223 @@
           <a:p>
             <a:pPr algn="r"/>
             <a:r>
-              <a:rPr lang="en-US" sz="900" dirty="0" smtClean="0">
+              <a:rPr lang="en-US" b="1" dirty="0">
+                <a:solidFill>
+                  <a:srgbClr val="7030A0"/>
+                </a:solidFill>
+              </a:rPr>
+              <a:t>Team Member</a:t>
+            </a:r>
+            <a:endParaRPr lang="en-SG" b="1" dirty="0">
+              <a:solidFill>
+                <a:srgbClr val="7030A0"/>
+              </a:solidFill>
+            </a:endParaRPr>
+          </a:p>
+        </p:txBody>
+      </p:sp>
+      <p:cxnSp>
+        <p:nvCxnSpPr>
+          <p:cNvPr id="84" name="Curved Connector 83"/>
+          <p:cNvCxnSpPr>
+            <a:stCxn id="135" idx="1"/>
+            <a:endCxn id="171" idx="0"/>
+          </p:cNvCxnSpPr>
+          <p:nvPr/>
+        </p:nvCxnSpPr>
+        <p:spPr>
+          <a:xfrm rot="10800000" flipH="1" flipV="1">
+            <a:off x="1866479" y="950142"/>
+            <a:ext cx="969367" cy="1051076"/>
+          </a:xfrm>
+          <a:prstGeom prst="curvedConnector4">
+            <a:avLst>
+              <a:gd name="adj1" fmla="val -23582"/>
+              <a:gd name="adj2" fmla="val 80758"/>
+            </a:avLst>
+          </a:prstGeom>
+          <a:ln w="28575">
+            <a:solidFill>
+              <a:srgbClr val="7030A0"/>
+            </a:solidFill>
+            <a:headEnd type="none" w="med" len="med"/>
+            <a:tailEnd type="triangle" w="med" len="med"/>
+          </a:ln>
+        </p:spPr>
+        <p:style>
+          <a:lnRef idx="1">
+            <a:schemeClr val="accent1"/>
+          </a:lnRef>
+          <a:fillRef idx="0">
+            <a:schemeClr val="accent1"/>
+          </a:fillRef>
+          <a:effectRef idx="0">
+            <a:schemeClr val="accent1"/>
+          </a:effectRef>
+          <a:fontRef idx="minor">
+            <a:schemeClr val="tx1"/>
+          </a:fontRef>
+        </p:style>
+      </p:cxnSp>
+      <p:sp>
+        <p:nvSpPr>
+          <p:cNvPr id="97" name="TextBox 96"/>
+          <p:cNvSpPr txBox="1"/>
+          <p:nvPr/>
+        </p:nvSpPr>
+        <p:spPr>
+          <a:xfrm>
+            <a:off x="2651125" y="1192897"/>
+            <a:ext cx="685800" cy="323165"/>
+          </a:xfrm>
+          <a:prstGeom prst="rect">
+            <a:avLst/>
+          </a:prstGeom>
+          <a:noFill/>
+        </p:spPr>
+        <p:txBody>
+          <a:bodyPr wrap="square" rtlCol="0">
+            <a:spAutoFit/>
+          </a:bodyPr>
+          <a:lstStyle/>
+          <a:p>
+            <a:r>
+              <a:rPr lang="en-US" dirty="0">
                 <a:solidFill>
                   <a:schemeClr val="bg1">
                     <a:lumMod val="50000"/>
                   </a:schemeClr>
                 </a:solidFill>
               </a:rPr>
-              <a:t>Abandoned by </a:t>
-            </a:r>
-            <a:r>
-              <a:rPr lang="en-US" sz="900" dirty="0" err="1" smtClean="0">
+              <a:t>Fixed</a:t>
+            </a:r>
+            <a:endParaRPr lang="en-SG" dirty="0">
+              <a:solidFill>
+                <a:schemeClr val="bg1">
+                  <a:lumMod val="50000"/>
+                </a:schemeClr>
+              </a:solidFill>
+            </a:endParaRPr>
+          </a:p>
+        </p:txBody>
+      </p:sp>
+      <p:sp>
+        <p:nvSpPr>
+          <p:cNvPr id="98" name="TextBox 97"/>
+          <p:cNvSpPr txBox="1"/>
+          <p:nvPr/>
+        </p:nvSpPr>
+        <p:spPr>
+          <a:xfrm>
+            <a:off x="1622115" y="1192897"/>
+            <a:ext cx="952810" cy="323165"/>
+          </a:xfrm>
+          <a:prstGeom prst="rect">
+            <a:avLst/>
+          </a:prstGeom>
+          <a:noFill/>
+        </p:spPr>
+        <p:txBody>
+          <a:bodyPr wrap="square" rtlCol="0">
+            <a:spAutoFit/>
+          </a:bodyPr>
+          <a:lstStyle/>
+          <a:p>
+            <a:r>
+              <a:rPr lang="en-US" dirty="0">
                 <a:solidFill>
                   <a:schemeClr val="bg1">
                     <a:lumMod val="50000"/>
                   </a:schemeClr>
                 </a:solidFill>
               </a:rPr>
-              <a:t>dev</a:t>
-            </a:r>
-            <a:endParaRPr lang="en-SG" sz="900" dirty="0">
+              <a:t>Outdated</a:t>
+            </a:r>
+            <a:endParaRPr lang="en-SG" dirty="0">
+              <a:solidFill>
+                <a:schemeClr val="bg1">
+                  <a:lumMod val="50000"/>
+                </a:schemeClr>
+              </a:solidFill>
+            </a:endParaRPr>
+          </a:p>
+        </p:txBody>
+      </p:sp>
+      <p:sp>
+        <p:nvSpPr>
+          <p:cNvPr id="101" name="TextBox 100"/>
+          <p:cNvSpPr txBox="1"/>
+          <p:nvPr/>
+        </p:nvSpPr>
+        <p:spPr>
+          <a:xfrm>
+            <a:off x="3645394" y="1726297"/>
+            <a:ext cx="1149194" cy="323165"/>
+          </a:xfrm>
+          <a:prstGeom prst="rect">
+            <a:avLst/>
+          </a:prstGeom>
+          <a:noFill/>
+        </p:spPr>
+        <p:txBody>
+          <a:bodyPr wrap="square" rtlCol="0">
+            <a:spAutoFit/>
+          </a:bodyPr>
+          <a:lstStyle/>
+          <a:p>
+            <a:r>
+              <a:rPr lang="en-US" dirty="0">
+                <a:solidFill>
+                  <a:schemeClr val="bg1">
+                    <a:lumMod val="50000"/>
+                  </a:schemeClr>
+                </a:solidFill>
+              </a:rPr>
+              <a:t>Abandoned</a:t>
+            </a:r>
+            <a:endParaRPr lang="en-SG" dirty="0">
+              <a:solidFill>
+                <a:schemeClr val="bg1">
+                  <a:lumMod val="50000"/>
+                </a:schemeClr>
+              </a:solidFill>
+            </a:endParaRPr>
+          </a:p>
+        </p:txBody>
+      </p:sp>
+      <p:sp>
+        <p:nvSpPr>
+          <p:cNvPr id="102" name="TextBox 101"/>
+          <p:cNvSpPr txBox="1"/>
+          <p:nvPr/>
+        </p:nvSpPr>
+        <p:spPr>
+          <a:xfrm>
+            <a:off x="5863185" y="1820862"/>
+            <a:ext cx="826540" cy="323165"/>
+          </a:xfrm>
+          <a:prstGeom prst="rect">
+            <a:avLst/>
+          </a:prstGeom>
+          <a:noFill/>
+        </p:spPr>
+        <p:txBody>
+          <a:bodyPr wrap="square" rtlCol="0">
+            <a:spAutoFit/>
+          </a:bodyPr>
+          <a:lstStyle/>
+          <a:p>
+            <a:r>
+              <a:rPr lang="en-US" dirty="0">
+                <a:solidFill>
+                  <a:schemeClr val="bg1">
+                    <a:lumMod val="50000"/>
+                  </a:schemeClr>
+                </a:solidFill>
+              </a:rPr>
+              <a:t>Merged</a:t>
+            </a:r>
+            <a:endParaRPr lang="en-SG" dirty="0">
               <a:solidFill>
                 <a:schemeClr val="bg1">
                   <a:lumMod val="50000"/>

</xml_diff>